<commit_message>
Change dilution factor to relative sample amount.
</commit_message>
<xml_diff>
--- a/docs/MS_Template_Creator_Summary.pptx
+++ b/docs/MS_Template_Creator_Summary.pptx
@@ -2141,7 +2141,7 @@
           </a:ln>
           <a:extLst>
             <a:ext uri="{C572A759-6A51-4108-AA02-DFA0A04FC94B}">
-              <ma14:wrappingTextBoxFlag xmlns:ma14="http://schemas.microsoft.com/office/mac/drawingml/2011/main" xmlns="" val="1"/>
+              <ma14:wrappingTextBoxFlag xmlns="" xmlns:ma14="http://schemas.microsoft.com/office/mac/drawingml/2011/main" val="1"/>
             </a:ext>
           </a:extLst>
         </p:spPr>
@@ -2180,7 +2180,7 @@
           </a:ln>
           <a:extLst>
             <a:ext uri="{C572A759-6A51-4108-AA02-DFA0A04FC94B}">
-              <ma14:wrappingTextBoxFlag xmlns:ma14="http://schemas.microsoft.com/office/mac/drawingml/2011/main" xmlns="" val="1"/>
+              <ma14:wrappingTextBoxFlag xmlns="" xmlns:ma14="http://schemas.microsoft.com/office/mac/drawingml/2011/main" val="1"/>
             </a:ext>
           </a:extLst>
         </p:spPr>
@@ -3118,7 +3118,7 @@
           </a:ln>
           <a:extLst>
             <a:ext uri="{C572A759-6A51-4108-AA02-DFA0A04FC94B}">
-              <ma14:wrappingTextBoxFlag xmlns:ma14="http://schemas.microsoft.com/office/mac/drawingml/2011/main" xmlns="" val="1"/>
+              <ma14:wrappingTextBoxFlag xmlns="" xmlns:ma14="http://schemas.microsoft.com/office/mac/drawingml/2011/main" val="1"/>
             </a:ext>
           </a:extLst>
         </p:spPr>
@@ -4193,7 +4193,7 @@
           </a:ln>
           <a:extLst>
             <a:ext uri="{C572A759-6A51-4108-AA02-DFA0A04FC94B}">
-              <ma14:wrappingTextBoxFlag xmlns:ma14="http://schemas.microsoft.com/office/mac/drawingml/2011/main" xmlns="" val="1"/>
+              <ma14:wrappingTextBoxFlag xmlns="" xmlns:ma14="http://schemas.microsoft.com/office/mac/drawingml/2011/main" val="1"/>
             </a:ext>
           </a:extLst>
         </p:spPr>
@@ -4231,7 +4231,7 @@
           </a:ln>
           <a:extLst>
             <a:ext uri="{C572A759-6A51-4108-AA02-DFA0A04FC94B}">
-              <ma14:wrappingTextBoxFlag xmlns:ma14="http://schemas.microsoft.com/office/mac/drawingml/2011/main" xmlns="" val="1"/>
+              <ma14:wrappingTextBoxFlag xmlns="" xmlns:ma14="http://schemas.microsoft.com/office/mac/drawingml/2011/main" val="1"/>
             </a:ext>
           </a:extLst>
         </p:spPr>
@@ -4331,7 +4331,7 @@
           </a:ln>
           <a:extLst>
             <a:ext uri="{C572A759-6A51-4108-AA02-DFA0A04FC94B}">
-              <ma14:wrappingTextBoxFlag xmlns:ma14="http://schemas.microsoft.com/office/mac/drawingml/2011/main" xmlns="" val="1"/>
+              <ma14:wrappingTextBoxFlag xmlns="" xmlns:ma14="http://schemas.microsoft.com/office/mac/drawingml/2011/main" val="1"/>
             </a:ext>
           </a:extLst>
         </p:spPr>
@@ -4369,7 +4369,7 @@
           </a:ln>
           <a:extLst>
             <a:ext uri="{C572A759-6A51-4108-AA02-DFA0A04FC94B}">
-              <ma14:wrappingTextBoxFlag xmlns:ma14="http://schemas.microsoft.com/office/mac/drawingml/2011/main" xmlns="" val="1"/>
+              <ma14:wrappingTextBoxFlag xmlns="" xmlns:ma14="http://schemas.microsoft.com/office/mac/drawingml/2011/main" val="1"/>
             </a:ext>
           </a:extLst>
         </p:spPr>
@@ -4486,7 +4486,7 @@
           </a:ln>
           <a:extLst>
             <a:ext uri="{C572A759-6A51-4108-AA02-DFA0A04FC94B}">
-              <ma14:wrappingTextBoxFlag xmlns:ma14="http://schemas.microsoft.com/office/mac/drawingml/2011/main" xmlns="" val="1"/>
+              <ma14:wrappingTextBoxFlag xmlns="" xmlns:ma14="http://schemas.microsoft.com/office/mac/drawingml/2011/main" val="1"/>
             </a:ext>
           </a:extLst>
         </p:spPr>
@@ -4524,7 +4524,7 @@
           </a:ln>
           <a:extLst>
             <a:ext uri="{C572A759-6A51-4108-AA02-DFA0A04FC94B}">
-              <ma14:wrappingTextBoxFlag xmlns:ma14="http://schemas.microsoft.com/office/mac/drawingml/2011/main" xmlns="" val="1"/>
+              <ma14:wrappingTextBoxFlag xmlns="" xmlns:ma14="http://schemas.microsoft.com/office/mac/drawingml/2011/main" val="1"/>
             </a:ext>
           </a:extLst>
         </p:spPr>
@@ -4658,7 +4658,7 @@
           </a:ln>
           <a:extLst>
             <a:ext uri="{C572A759-6A51-4108-AA02-DFA0A04FC94B}">
-              <ma14:wrappingTextBoxFlag xmlns:ma14="http://schemas.microsoft.com/office/mac/drawingml/2011/main" xmlns="" val="1"/>
+              <ma14:wrappingTextBoxFlag xmlns="" xmlns:ma14="http://schemas.microsoft.com/office/mac/drawingml/2011/main" val="1"/>
             </a:ext>
           </a:extLst>
         </p:spPr>
@@ -4732,7 +4732,7 @@
           </a:ln>
           <a:extLst>
             <a:ext uri="{C572A759-6A51-4108-AA02-DFA0A04FC94B}">
-              <ma14:wrappingTextBoxFlag xmlns:ma14="http://schemas.microsoft.com/office/mac/drawingml/2011/main" xmlns="" val="1"/>
+              <ma14:wrappingTextBoxFlag xmlns="" xmlns:ma14="http://schemas.microsoft.com/office/mac/drawingml/2011/main" val="1"/>
             </a:ext>
           </a:extLst>
         </p:spPr>
@@ -4836,7 +4836,7 @@
           </a:ln>
           <a:extLst>
             <a:ext uri="{C572A759-6A51-4108-AA02-DFA0A04FC94B}">
-              <ma14:wrappingTextBoxFlag xmlns:ma14="http://schemas.microsoft.com/office/mac/drawingml/2011/main" xmlns="" val="1"/>
+              <ma14:wrappingTextBoxFlag xmlns="" xmlns:ma14="http://schemas.microsoft.com/office/mac/drawingml/2011/main" val="1"/>
             </a:ext>
           </a:extLst>
         </p:spPr>
@@ -4939,7 +4939,7 @@
           </a:ln>
           <a:extLst>
             <a:ext uri="{C572A759-6A51-4108-AA02-DFA0A04FC94B}">
-              <ma14:wrappingTextBoxFlag xmlns:ma14="http://schemas.microsoft.com/office/mac/drawingml/2011/main" xmlns="" val="1"/>
+              <ma14:wrappingTextBoxFlag xmlns="" xmlns:ma14="http://schemas.microsoft.com/office/mac/drawingml/2011/main" val="1"/>
             </a:ext>
           </a:extLst>
         </p:spPr>
@@ -5029,7 +5029,7 @@
           </a:ln>
           <a:extLst>
             <a:ext uri="{C572A759-6A51-4108-AA02-DFA0A04FC94B}">
-              <ma14:wrappingTextBoxFlag xmlns:ma14="http://schemas.microsoft.com/office/mac/drawingml/2011/main" xmlns="" val="1"/>
+              <ma14:wrappingTextBoxFlag xmlns="" xmlns:ma14="http://schemas.microsoft.com/office/mac/drawingml/2011/main" val="1"/>
             </a:ext>
           </a:extLst>
         </p:spPr>
@@ -5110,7 +5110,7 @@
           </a:ln>
           <a:extLst>
             <a:ext uri="{C572A759-6A51-4108-AA02-DFA0A04FC94B}">
-              <ma14:wrappingTextBoxFlag xmlns:ma14="http://schemas.microsoft.com/office/mac/drawingml/2011/main" xmlns="" val="1"/>
+              <ma14:wrappingTextBoxFlag xmlns="" xmlns:ma14="http://schemas.microsoft.com/office/mac/drawingml/2011/main" val="1"/>
             </a:ext>
           </a:extLst>
         </p:spPr>
@@ -5213,7 +5213,7 @@
           </a:ln>
           <a:extLst>
             <a:ext uri="{C572A759-6A51-4108-AA02-DFA0A04FC94B}">
-              <ma14:wrappingTextBoxFlag xmlns:ma14="http://schemas.microsoft.com/office/mac/drawingml/2011/main" xmlns="" val="1"/>
+              <ma14:wrappingTextBoxFlag xmlns="" xmlns:ma14="http://schemas.microsoft.com/office/mac/drawingml/2011/main" val="1"/>
             </a:ext>
           </a:extLst>
         </p:spPr>
@@ -5356,7 +5356,7 @@
           </a:ln>
           <a:extLst>
             <a:ext uri="{C572A759-6A51-4108-AA02-DFA0A04FC94B}">
-              <ma14:wrappingTextBoxFlag xmlns:ma14="http://schemas.microsoft.com/office/mac/drawingml/2011/main" xmlns="" val="1"/>
+              <ma14:wrappingTextBoxFlag xmlns="" xmlns:ma14="http://schemas.microsoft.com/office/mac/drawingml/2011/main" val="1"/>
             </a:ext>
           </a:extLst>
         </p:spPr>
@@ -5412,7 +5412,7 @@
           </a:ln>
           <a:extLst>
             <a:ext uri="{C572A759-6A51-4108-AA02-DFA0A04FC94B}">
-              <ma14:wrappingTextBoxFlag xmlns:ma14="http://schemas.microsoft.com/office/mac/drawingml/2011/main" xmlns="" val="1"/>
+              <ma14:wrappingTextBoxFlag xmlns="" xmlns:ma14="http://schemas.microsoft.com/office/mac/drawingml/2011/main" val="1"/>
             </a:ext>
           </a:extLst>
         </p:spPr>
@@ -5456,7 +5456,7 @@
           </a:ln>
           <a:extLst>
             <a:ext uri="{C572A759-6A51-4108-AA02-DFA0A04FC94B}">
-              <ma14:wrappingTextBoxFlag xmlns:ma14="http://schemas.microsoft.com/office/mac/drawingml/2011/main" xmlns="" val="1"/>
+              <ma14:wrappingTextBoxFlag xmlns="" xmlns:ma14="http://schemas.microsoft.com/office/mac/drawingml/2011/main" val="1"/>
             </a:ext>
           </a:extLst>
         </p:spPr>
@@ -5616,7 +5616,7 @@
           </a:ln>
           <a:extLst>
             <a:ext uri="{C572A759-6A51-4108-AA02-DFA0A04FC94B}">
-              <ma14:wrappingTextBoxFlag xmlns:ma14="http://schemas.microsoft.com/office/mac/drawingml/2011/main" xmlns="" val="1"/>
+              <ma14:wrappingTextBoxFlag xmlns="" xmlns:ma14="http://schemas.microsoft.com/office/mac/drawingml/2011/main" val="1"/>
             </a:ext>
           </a:extLst>
         </p:spPr>
@@ -5672,7 +5672,7 @@
           </a:ln>
           <a:extLst>
             <a:ext uri="{C572A759-6A51-4108-AA02-DFA0A04FC94B}">
-              <ma14:wrappingTextBoxFlag xmlns:ma14="http://schemas.microsoft.com/office/mac/drawingml/2011/main" xmlns="" val="1"/>
+              <ma14:wrappingTextBoxFlag xmlns="" xmlns:ma14="http://schemas.microsoft.com/office/mac/drawingml/2011/main" val="1"/>
             </a:ext>
           </a:extLst>
         </p:spPr>
@@ -5716,7 +5716,7 @@
           </a:ln>
           <a:extLst>
             <a:ext uri="{C572A759-6A51-4108-AA02-DFA0A04FC94B}">
-              <ma14:wrappingTextBoxFlag xmlns:ma14="http://schemas.microsoft.com/office/mac/drawingml/2011/main" xmlns="" val="1"/>
+              <ma14:wrappingTextBoxFlag xmlns="" xmlns:ma14="http://schemas.microsoft.com/office/mac/drawingml/2011/main" val="1"/>
             </a:ext>
           </a:extLst>
         </p:spPr>
@@ -5940,7 +5940,7 @@
           </a:ln>
           <a:extLst>
             <a:ext uri="{C572A759-6A51-4108-AA02-DFA0A04FC94B}">
-              <ma14:wrappingTextBoxFlag xmlns:ma14="http://schemas.microsoft.com/office/mac/drawingml/2011/main" xmlns="" val="1"/>
+              <ma14:wrappingTextBoxFlag xmlns="" xmlns:ma14="http://schemas.microsoft.com/office/mac/drawingml/2011/main" val="1"/>
             </a:ext>
           </a:extLst>
         </p:spPr>
@@ -6044,7 +6044,7 @@
           </a:ln>
           <a:extLst>
             <a:ext uri="{C572A759-6A51-4108-AA02-DFA0A04FC94B}">
-              <ma14:wrappingTextBoxFlag xmlns:ma14="http://schemas.microsoft.com/office/mac/drawingml/2011/main" xmlns="" val="1"/>
+              <ma14:wrappingTextBoxFlag xmlns="" xmlns:ma14="http://schemas.microsoft.com/office/mac/drawingml/2011/main" val="1"/>
             </a:ext>
           </a:extLst>
         </p:spPr>
@@ -6088,7 +6088,7 @@
           </a:ln>
           <a:extLst>
             <a:ext uri="{C572A759-6A51-4108-AA02-DFA0A04FC94B}">
-              <ma14:wrappingTextBoxFlag xmlns:ma14="http://schemas.microsoft.com/office/mac/drawingml/2011/main" xmlns="" val="1"/>
+              <ma14:wrappingTextBoxFlag xmlns="" xmlns:ma14="http://schemas.microsoft.com/office/mac/drawingml/2011/main" val="1"/>
             </a:ext>
           </a:extLst>
         </p:spPr>
@@ -6184,7 +6184,7 @@
           </a:ln>
           <a:extLst>
             <a:ext uri="{C572A759-6A51-4108-AA02-DFA0A04FC94B}">
-              <ma14:wrappingTextBoxFlag xmlns:ma14="http://schemas.microsoft.com/office/mac/drawingml/2011/main" xmlns="" val="1"/>
+              <ma14:wrappingTextBoxFlag xmlns="" xmlns:ma14="http://schemas.microsoft.com/office/mac/drawingml/2011/main" val="1"/>
             </a:ext>
           </a:extLst>
         </p:spPr>
@@ -6306,7 +6306,7 @@
           </a:ln>
           <a:extLst>
             <a:ext uri="{C572A759-6A51-4108-AA02-DFA0A04FC94B}">
-              <ma14:wrappingTextBoxFlag xmlns:ma14="http://schemas.microsoft.com/office/mac/drawingml/2011/main" xmlns="" val="1"/>
+              <ma14:wrappingTextBoxFlag xmlns="" xmlns:ma14="http://schemas.microsoft.com/office/mac/drawingml/2011/main" val="1"/>
             </a:ext>
           </a:extLst>
         </p:spPr>
@@ -6617,7 +6617,7 @@
           </a:ln>
           <a:extLst>
             <a:ext uri="{C572A759-6A51-4108-AA02-DFA0A04FC94B}">
-              <ma14:wrappingTextBoxFlag xmlns:ma14="http://schemas.microsoft.com/office/mac/drawingml/2011/main" xmlns="" val="1"/>
+              <ma14:wrappingTextBoxFlag xmlns="" xmlns:ma14="http://schemas.microsoft.com/office/mac/drawingml/2011/main" val="1"/>
             </a:ext>
           </a:extLst>
         </p:spPr>
@@ -6683,7 +6683,7 @@
           </a:ln>
           <a:extLst>
             <a:ext uri="{C572A759-6A51-4108-AA02-DFA0A04FC94B}">
-              <ma14:wrappingTextBoxFlag xmlns:ma14="http://schemas.microsoft.com/office/mac/drawingml/2011/main" xmlns="" val="1"/>
+              <ma14:wrappingTextBoxFlag xmlns="" xmlns:ma14="http://schemas.microsoft.com/office/mac/drawingml/2011/main" val="1"/>
             </a:ext>
           </a:extLst>
         </p:spPr>
@@ -6749,7 +6749,7 @@
           </a:ln>
           <a:extLst>
             <a:ext uri="{C572A759-6A51-4108-AA02-DFA0A04FC94B}">
-              <ma14:wrappingTextBoxFlag xmlns:ma14="http://schemas.microsoft.com/office/mac/drawingml/2011/main" xmlns="" val="1"/>
+              <ma14:wrappingTextBoxFlag xmlns="" xmlns:ma14="http://schemas.microsoft.com/office/mac/drawingml/2011/main" val="1"/>
             </a:ext>
           </a:extLst>
         </p:spPr>
@@ -6909,7 +6909,7 @@
           </a:ln>
           <a:extLst>
             <a:ext uri="{C572A759-6A51-4108-AA02-DFA0A04FC94B}">
-              <ma14:wrappingTextBoxFlag xmlns:ma14="http://schemas.microsoft.com/office/mac/drawingml/2011/main" xmlns="" val="1"/>
+              <ma14:wrappingTextBoxFlag xmlns="" xmlns:ma14="http://schemas.microsoft.com/office/mac/drawingml/2011/main" val="1"/>
             </a:ext>
           </a:extLst>
         </p:spPr>
@@ -6977,7 +6977,7 @@
           </a:ln>
           <a:extLst>
             <a:ext uri="{C572A759-6A51-4108-AA02-DFA0A04FC94B}">
-              <ma14:wrappingTextBoxFlag xmlns:ma14="http://schemas.microsoft.com/office/mac/drawingml/2011/main" xmlns="" val="1"/>
+              <ma14:wrappingTextBoxFlag xmlns="" xmlns:ma14="http://schemas.microsoft.com/office/mac/drawingml/2011/main" val="1"/>
             </a:ext>
           </a:extLst>
         </p:spPr>
@@ -7154,7 +7154,7 @@
           </a:ln>
           <a:extLst>
             <a:ext uri="{C572A759-6A51-4108-AA02-DFA0A04FC94B}">
-              <ma14:wrappingTextBoxFlag xmlns:ma14="http://schemas.microsoft.com/office/mac/drawingml/2011/main" xmlns="" val="1"/>
+              <ma14:wrappingTextBoxFlag xmlns="" xmlns:ma14="http://schemas.microsoft.com/office/mac/drawingml/2011/main" val="1"/>
             </a:ext>
           </a:extLst>
         </p:spPr>
@@ -7280,7 +7280,7 @@
           </a:ln>
           <a:extLst>
             <a:ext uri="{C572A759-6A51-4108-AA02-DFA0A04FC94B}">
-              <ma14:wrappingTextBoxFlag xmlns:ma14="http://schemas.microsoft.com/office/mac/drawingml/2011/main" xmlns="" val="1"/>
+              <ma14:wrappingTextBoxFlag xmlns="" xmlns:ma14="http://schemas.microsoft.com/office/mac/drawingml/2011/main" val="1"/>
             </a:ext>
           </a:extLst>
         </p:spPr>
@@ -7342,7 +7342,7 @@
           </a:ln>
           <a:extLst>
             <a:ext uri="{C572A759-6A51-4108-AA02-DFA0A04FC94B}">
-              <ma14:wrappingTextBoxFlag xmlns:ma14="http://schemas.microsoft.com/office/mac/drawingml/2011/main" xmlns="" val="1"/>
+              <ma14:wrappingTextBoxFlag xmlns="" xmlns:ma14="http://schemas.microsoft.com/office/mac/drawingml/2011/main" val="1"/>
             </a:ext>
           </a:extLst>
         </p:spPr>
@@ -7442,7 +7442,7 @@
           </a:ln>
           <a:extLst>
             <a:ext uri="{C572A759-6A51-4108-AA02-DFA0A04FC94B}">
-              <ma14:wrappingTextBoxFlag xmlns:ma14="http://schemas.microsoft.com/office/mac/drawingml/2011/main" xmlns="" val="1"/>
+              <ma14:wrappingTextBoxFlag xmlns="" xmlns:ma14="http://schemas.microsoft.com/office/mac/drawingml/2011/main" val="1"/>
             </a:ext>
           </a:extLst>
         </p:spPr>
@@ -7480,7 +7480,7 @@
           </a:ln>
           <a:extLst>
             <a:ext uri="{C572A759-6A51-4108-AA02-DFA0A04FC94B}">
-              <ma14:wrappingTextBoxFlag xmlns:ma14="http://schemas.microsoft.com/office/mac/drawingml/2011/main" xmlns="" val="1"/>
+              <ma14:wrappingTextBoxFlag xmlns="" xmlns:ma14="http://schemas.microsoft.com/office/mac/drawingml/2011/main" val="1"/>
             </a:ext>
           </a:extLst>
         </p:spPr>
@@ -7538,7 +7538,7 @@
           </a:ln>
           <a:extLst>
             <a:ext uri="{C572A759-6A51-4108-AA02-DFA0A04FC94B}">
-              <ma14:wrappingTextBoxFlag xmlns:ma14="http://schemas.microsoft.com/office/mac/drawingml/2011/main" xmlns="" val="1"/>
+              <ma14:wrappingTextBoxFlag xmlns="" xmlns:ma14="http://schemas.microsoft.com/office/mac/drawingml/2011/main" val="1"/>
             </a:ext>
           </a:extLst>
         </p:spPr>
@@ -7630,7 +7630,7 @@
           </a:ln>
           <a:extLst>
             <a:ext uri="{C572A759-6A51-4108-AA02-DFA0A04FC94B}">
-              <ma14:wrappingTextBoxFlag xmlns:ma14="http://schemas.microsoft.com/office/mac/drawingml/2011/main" xmlns="" val="1"/>
+              <ma14:wrappingTextBoxFlag xmlns="" xmlns:ma14="http://schemas.microsoft.com/office/mac/drawingml/2011/main" val="1"/>
             </a:ext>
           </a:extLst>
         </p:spPr>
@@ -7674,7 +7674,7 @@
           </a:ln>
           <a:extLst>
             <a:ext uri="{C572A759-6A51-4108-AA02-DFA0A04FC94B}">
-              <ma14:wrappingTextBoxFlag xmlns:ma14="http://schemas.microsoft.com/office/mac/drawingml/2011/main" xmlns="" val="1"/>
+              <ma14:wrappingTextBoxFlag xmlns="" xmlns:ma14="http://schemas.microsoft.com/office/mac/drawingml/2011/main" val="1"/>
             </a:ext>
           </a:extLst>
         </p:spPr>
@@ -7757,8 +7757,8 @@
         </p:nvSpPr>
         <p:spPr>
           <a:xfrm>
-            <a:off x="7819436" y="1711493"/>
-            <a:ext cx="5903579" cy="442605"/>
+            <a:off x="7819436" y="1628394"/>
+            <a:ext cx="5903579" cy="608804"/>
           </a:xfrm>
           <a:prstGeom prst="rect">
             <a:avLst/>
@@ -7768,7 +7768,7 @@
           </a:ln>
           <a:extLst>
             <a:ext uri="{C572A759-6A51-4108-AA02-DFA0A04FC94B}">
-              <ma14:wrappingTextBoxFlag xmlns:ma14="http://schemas.microsoft.com/office/mac/drawingml/2011/main" xmlns="" val="1"/>
+              <ma14:wrappingTextBoxFlag xmlns="" xmlns:ma14="http://schemas.microsoft.com/office/mac/drawingml/2011/main" val="1"/>
             </a:ext>
           </a:extLst>
         </p:spPr>
@@ -7811,7 +7811,7 @@
                 <a:ea typeface="Source Sans Pro" panose="020B0503030403020204" pitchFamily="34" charset="0"/>
                 <a:sym typeface="Source Sans Pro Light"/>
               </a:rPr>
-              <a:t>fill in the dilution batch name , the dilution factor in % and Injection volume in </a:t>
+              <a:t>fill in the dilution batch name , the relative sample amount in % and Injection volume in </a:t>
             </a:r>
             <a:r>
               <a:rPr lang="en-US" b="0" dirty="0" err="1">
@@ -7917,36 +7917,6 @@
           </a:prstGeom>
         </p:spPr>
       </p:pic>
-      <p:pic>
-        <p:nvPicPr>
-          <p:cNvPr id="5" name="Picture 4">
-            <a:extLst>
-              <a:ext uri="{FF2B5EF4-FFF2-40B4-BE49-F238E27FC236}">
-                <a16:creationId xmlns:a16="http://schemas.microsoft.com/office/drawing/2014/main" id="{9C04F100-9889-4BDC-862A-7B1310F2F077}"/>
-              </a:ext>
-            </a:extLst>
-          </p:cNvPr>
-          <p:cNvPicPr>
-            <a:picLocks noChangeAspect="1"/>
-          </p:cNvPicPr>
-          <p:nvPr/>
-        </p:nvPicPr>
-        <p:blipFill>
-          <a:blip r:embed="rId5"/>
-          <a:stretch>
-            <a:fillRect/>
-          </a:stretch>
-        </p:blipFill>
-        <p:spPr>
-          <a:xfrm>
-            <a:off x="7925788" y="2249087"/>
-            <a:ext cx="5690874" cy="831189"/>
-          </a:xfrm>
-          <a:prstGeom prst="rect">
-            <a:avLst/>
-          </a:prstGeom>
-        </p:spPr>
-      </p:pic>
       <p:sp>
         <p:nvSpPr>
           <p:cNvPr id="17" name="CODE">
@@ -7972,7 +7942,7 @@
           </a:ln>
           <a:extLst>
             <a:ext uri="{C572A759-6A51-4108-AA02-DFA0A04FC94B}">
-              <ma14:wrappingTextBoxFlag xmlns:ma14="http://schemas.microsoft.com/office/mac/drawingml/2011/main" xmlns="" val="1"/>
+              <ma14:wrappingTextBoxFlag xmlns="" xmlns:ma14="http://schemas.microsoft.com/office/mac/drawingml/2011/main" val="1"/>
             </a:ext>
           </a:extLst>
         </p:spPr>
@@ -8020,7 +7990,7 @@
           </a:ln>
           <a:extLst>
             <a:ext uri="{C572A759-6A51-4108-AA02-DFA0A04FC94B}">
-              <ma14:wrappingTextBoxFlag xmlns:ma14="http://schemas.microsoft.com/office/mac/drawingml/2011/main" xmlns="" val="1"/>
+              <ma14:wrappingTextBoxFlag xmlns="" xmlns:ma14="http://schemas.microsoft.com/office/mac/drawingml/2011/main" val="1"/>
             </a:ext>
           </a:extLst>
         </p:spPr>
@@ -8096,7 +8066,7 @@
           <p:nvPr/>
         </p:nvPicPr>
         <p:blipFill>
-          <a:blip r:embed="rId6"/>
+          <a:blip r:embed="rId5"/>
           <a:stretch>
             <a:fillRect/>
           </a:stretch>
@@ -8136,7 +8106,7 @@
           </a:ln>
           <a:extLst>
             <a:ext uri="{C572A759-6A51-4108-AA02-DFA0A04FC94B}">
-              <ma14:wrappingTextBoxFlag xmlns:ma14="http://schemas.microsoft.com/office/mac/drawingml/2011/main" xmlns="" val="1"/>
+              <ma14:wrappingTextBoxFlag xmlns="" xmlns:ma14="http://schemas.microsoft.com/office/mac/drawingml/2011/main" val="1"/>
             </a:ext>
           </a:extLst>
         </p:spPr>
@@ -8195,7 +8165,7 @@
           <p:nvPr/>
         </p:nvPicPr>
         <p:blipFill>
-          <a:blip r:embed="rId7"/>
+          <a:blip r:embed="rId6"/>
           <a:stretch>
             <a:fillRect/>
           </a:stretch>
@@ -8235,7 +8205,7 @@
           </a:ln>
           <a:extLst>
             <a:ext uri="{C572A759-6A51-4108-AA02-DFA0A04FC94B}">
-              <ma14:wrappingTextBoxFlag xmlns:ma14="http://schemas.microsoft.com/office/mac/drawingml/2011/main" xmlns="" val="1"/>
+              <ma14:wrappingTextBoxFlag xmlns="" xmlns:ma14="http://schemas.microsoft.com/office/mac/drawingml/2011/main" val="1"/>
             </a:ext>
           </a:extLst>
         </p:spPr>
@@ -8296,6 +8266,36 @@
           <p:nvPr/>
         </p:nvPicPr>
         <p:blipFill>
+          <a:blip r:embed="rId7"/>
+          <a:stretch>
+            <a:fillRect/>
+          </a:stretch>
+        </p:blipFill>
+        <p:spPr>
+          <a:xfrm>
+            <a:off x="545714" y="4953201"/>
+            <a:ext cx="2690889" cy="543161"/>
+          </a:xfrm>
+          <a:prstGeom prst="rect">
+            <a:avLst/>
+          </a:prstGeom>
+        </p:spPr>
+      </p:pic>
+      <p:pic>
+        <p:nvPicPr>
+          <p:cNvPr id="6" name="Picture 5">
+            <a:extLst>
+              <a:ext uri="{FF2B5EF4-FFF2-40B4-BE49-F238E27FC236}">
+                <a16:creationId xmlns:a16="http://schemas.microsoft.com/office/drawing/2014/main" id="{359E4FCF-5562-456C-AAB2-940B76DBADC8}"/>
+              </a:ext>
+            </a:extLst>
+          </p:cNvPr>
+          <p:cNvPicPr>
+            <a:picLocks noChangeAspect="1"/>
+          </p:cNvPicPr>
+          <p:nvPr/>
+        </p:nvPicPr>
+        <p:blipFill>
           <a:blip r:embed="rId8"/>
           <a:stretch>
             <a:fillRect/>
@@ -8303,8 +8303,8 @@
         </p:blipFill>
         <p:spPr>
           <a:xfrm>
-            <a:off x="545714" y="4953201"/>
-            <a:ext cx="2690889" cy="543161"/>
+            <a:off x="7944478" y="2151023"/>
+            <a:ext cx="5778537" cy="786552"/>
           </a:xfrm>
           <a:prstGeom prst="rect">
             <a:avLst/>

</xml_diff>

<commit_message>
Fix bugs when reading transition names with qualifiers in Agilent Compound Table form. Create unit test for reading transition names with Qualifiers for Agilent Wide Table and Compound Table form.
</commit_message>
<xml_diff>
--- a/docs/MS_Template_Creator_Summary.pptx
+++ b/docs/MS_Template_Creator_Summary.pptx
@@ -2141,7 +2141,7 @@
           </a:ln>
           <a:extLst>
             <a:ext uri="{C572A759-6A51-4108-AA02-DFA0A04FC94B}">
-              <ma14:wrappingTextBoxFlag xmlns:ma14="http://schemas.microsoft.com/office/mac/drawingml/2011/main" xmlns="" val="1"/>
+              <ma14:wrappingTextBoxFlag xmlns="" xmlns:ma14="http://schemas.microsoft.com/office/mac/drawingml/2011/main" val="1"/>
             </a:ext>
           </a:extLst>
         </p:spPr>
@@ -2180,7 +2180,7 @@
           </a:ln>
           <a:extLst>
             <a:ext uri="{C572A759-6A51-4108-AA02-DFA0A04FC94B}">
-              <ma14:wrappingTextBoxFlag xmlns:ma14="http://schemas.microsoft.com/office/mac/drawingml/2011/main" xmlns="" val="1"/>
+              <ma14:wrappingTextBoxFlag xmlns="" xmlns:ma14="http://schemas.microsoft.com/office/mac/drawingml/2011/main" val="1"/>
             </a:ext>
           </a:extLst>
         </p:spPr>
@@ -3107,7 +3107,7 @@
         </p:nvSpPr>
         <p:spPr>
           <a:xfrm>
-            <a:off x="244588" y="1108677"/>
+            <a:off x="244588" y="1137253"/>
             <a:ext cx="2061462" cy="340029"/>
           </a:xfrm>
           <a:prstGeom prst="rect">
@@ -3118,7 +3118,7 @@
           </a:ln>
           <a:extLst>
             <a:ext uri="{C572A759-6A51-4108-AA02-DFA0A04FC94B}">
-              <ma14:wrappingTextBoxFlag xmlns:ma14="http://schemas.microsoft.com/office/mac/drawingml/2011/main" xmlns="" val="1"/>
+              <ma14:wrappingTextBoxFlag xmlns="" xmlns:ma14="http://schemas.microsoft.com/office/mac/drawingml/2011/main" val="1"/>
             </a:ext>
           </a:extLst>
         </p:spPr>
@@ -3157,7 +3157,7 @@
         </p:nvSpPr>
         <p:spPr>
           <a:xfrm>
-            <a:off x="305939" y="1060800"/>
+            <a:off x="305939" y="1089376"/>
             <a:ext cx="3037294" cy="1"/>
           </a:xfrm>
           <a:prstGeom prst="line">
@@ -3224,48 +3224,6 @@
           </a:p>
         </p:txBody>
       </p:sp>
-      <p:sp>
-        <p:nvSpPr>
-          <p:cNvPr id="135" name="Line"/>
-          <p:cNvSpPr/>
-          <p:nvPr/>
-        </p:nvSpPr>
-        <p:spPr>
-          <a:xfrm flipV="1">
-            <a:off x="253238" y="1039190"/>
-            <a:ext cx="4643140" cy="39644"/>
-          </a:xfrm>
-          <a:prstGeom prst="line">
-            <a:avLst/>
-          </a:prstGeom>
-          <a:ln w="3175">
-            <a:solidFill>
-              <a:srgbClr val="767C85"/>
-            </a:solidFill>
-            <a:miter lim="400000"/>
-          </a:ln>
-        </p:spPr>
-        <p:txBody>
-          <a:bodyPr lIns="54570" tIns="54570" rIns="54570" bIns="54570" anchor="ctr"/>
-          <a:lstStyle/>
-          <a:p>
-            <a:pPr>
-              <a:lnSpc>
-                <a:spcPct val="80000"/>
-              </a:lnSpc>
-              <a:spcBef>
-                <a:spcPts val="600"/>
-              </a:spcBef>
-              <a:defRPr b="0">
-                <a:solidFill>
-                  <a:srgbClr val="000000"/>
-                </a:solidFill>
-              </a:defRPr>
-            </a:pPr>
-            <a:endParaRPr/>
-          </a:p>
-        </p:txBody>
-      </p:sp>
       <p:graphicFrame>
         <p:nvGraphicFramePr>
           <p:cNvPr id="2" name="Table 1"/>
@@ -3275,35 +3233,42 @@
           <p:nvPr>
             <p:extLst>
               <p:ext uri="{D42A27DB-BD31-4B8C-83A1-F6EECF244321}">
-                <p14:modId xmlns:p14="http://schemas.microsoft.com/office/powerpoint/2010/main" val="3247451939"/>
+                <p14:modId xmlns:p14="http://schemas.microsoft.com/office/powerpoint/2010/main" val="3536547813"/>
               </p:ext>
             </p:extLst>
           </p:nvPr>
         </p:nvGraphicFramePr>
         <p:xfrm>
-          <a:off x="273856" y="1792736"/>
-          <a:ext cx="4512087" cy="1920177"/>
+          <a:off x="273856" y="1841267"/>
+          <a:ext cx="4421440" cy="2003837"/>
         </p:xfrm>
         <a:graphic>
           <a:graphicData uri="http://schemas.openxmlformats.org/drawingml/2006/table">
             <a:tbl>
               <a:tblPr firstRow="1" firstCol="1" bandRow="1"/>
               <a:tblGrid>
-                <a:gridCol w="1168501">
+                <a:gridCol w="1095581">
                   <a:extLst>
                     <a:ext uri="{9D8B030D-6E8A-4147-A177-3AD203B41FA5}">
                       <a16:colId xmlns:a16="http://schemas.microsoft.com/office/drawing/2014/main" val="2286104041"/>
                     </a:ext>
                   </a:extLst>
                 </a:gridCol>
-                <a:gridCol w="1448111">
+                <a:gridCol w="1175643">
                   <a:extLst>
                     <a:ext uri="{9D8B030D-6E8A-4147-A177-3AD203B41FA5}">
                       <a16:colId xmlns:a16="http://schemas.microsoft.com/office/drawing/2014/main" val="4176594841"/>
                     </a:ext>
                   </a:extLst>
                 </a:gridCol>
-                <a:gridCol w="1895475">
+                <a:gridCol w="990600">
+                  <a:extLst>
+                    <a:ext uri="{9D8B030D-6E8A-4147-A177-3AD203B41FA5}">
+                      <a16:colId xmlns:a16="http://schemas.microsoft.com/office/drawing/2014/main" val="3056500363"/>
+                    </a:ext>
+                  </a:extLst>
+                </a:gridCol>
+                <a:gridCol w="1159616">
                   <a:extLst>
                     <a:ext uri="{9D8B030D-6E8A-4147-A177-3AD203B41FA5}">
                       <a16:colId xmlns:a16="http://schemas.microsoft.com/office/drawing/2014/main" val="1444976199"/>
@@ -3311,8 +3276,8 @@
                   </a:extLst>
                 </a:gridCol>
               </a:tblGrid>
-              <a:tr h="0">
-                <a:tc>
+              <a:tr h="166396">
+                <a:tc rowSpan="2">
                   <a:txBody>
                     <a:bodyPr/>
                     <a:lstStyle/>
@@ -3326,7 +3291,7 @@
                         </a:spcAft>
                       </a:pPr>
                       <a:r>
-                        <a:rPr lang="en-SG" sz="1000" b="1">
+                        <a:rPr lang="en-SG" sz="1000" b="1" dirty="0">
                           <a:effectLst/>
                           <a:latin typeface="Corbel" panose="020B0503020204020204" pitchFamily="34" charset="0"/>
                           <a:ea typeface="STKaiti"/>
@@ -3334,7 +3299,7 @@
                         </a:rPr>
                         <a:t>MRM transition names data form</a:t>
                       </a:r>
-                      <a:endParaRPr lang="en-SG" sz="1000">
+                      <a:endParaRPr lang="en-SG" sz="1000" dirty="0">
                         <a:effectLst/>
                         <a:latin typeface="Corbel" panose="020B0503020204020204" pitchFamily="34" charset="0"/>
                         <a:ea typeface="STKaiti"/>
@@ -3384,7 +3349,7 @@
                     </a:solidFill>
                   </a:tcPr>
                 </a:tc>
-                <a:tc>
+                <a:tc gridSpan="2">
                   <a:txBody>
                     <a:bodyPr/>
                     <a:lstStyle/>
@@ -3456,7 +3421,27 @@
                     </a:solidFill>
                   </a:tcPr>
                 </a:tc>
-                <a:tc>
+                <a:tc hMerge="1">
+                  <a:txBody>
+                    <a:bodyPr/>
+                    <a:lstStyle/>
+                    <a:p>
+                      <a:endParaRPr lang="en-SG"/>
+                    </a:p>
+                  </a:txBody>
+                  <a:tcPr>
+                    <a:lnL w="12700" cap="flat" cmpd="sng" algn="ctr">
+                      <a:solidFill>
+                        <a:srgbClr val="000000"/>
+                      </a:solidFill>
+                      <a:prstDash val="solid"/>
+                      <a:round/>
+                      <a:headEnd type="none" w="med" len="med"/>
+                      <a:tailEnd type="none" w="med" len="med"/>
+                    </a:lnL>
+                  </a:tcPr>
+                </a:tc>
+                <a:tc rowSpan="2">
                   <a:txBody>
                     <a:bodyPr/>
                     <a:lstStyle/>
@@ -3534,7 +3519,187 @@
                   </a:ext>
                 </a:extLst>
               </a:tr>
-              <a:tr h="0">
+              <a:tr h="166396">
+                <a:tc vMerge="1">
+                  <a:txBody>
+                    <a:bodyPr/>
+                    <a:lstStyle/>
+                    <a:p>
+                      <a:endParaRPr lang="en-SG"/>
+                    </a:p>
+                  </a:txBody>
+                  <a:tcPr/>
+                </a:tc>
+                <a:tc>
+                  <a:txBody>
+                    <a:bodyPr/>
+                    <a:lstStyle/>
+                    <a:p>
+                      <a:pPr marL="0" marR="0" lvl="0" indent="0" algn="ctr" defTabSz="584200" rtl="0" eaLnBrk="1" fontAlgn="auto" latinLnBrk="0" hangingPunct="1">
+                        <a:lnSpc>
+                          <a:spcPct val="107000"/>
+                        </a:lnSpc>
+                        <a:spcBef>
+                          <a:spcPts val="0"/>
+                        </a:spcBef>
+                        <a:spcAft>
+                          <a:spcPts val="0"/>
+                        </a:spcAft>
+                        <a:buClrTx/>
+                        <a:buSzTx/>
+                        <a:buFontTx/>
+                        <a:buNone/>
+                        <a:tabLst/>
+                        <a:defRPr/>
+                      </a:pPr>
+                      <a:r>
+                        <a:rPr lang="en-SG" sz="1000" b="1" dirty="0">
+                          <a:effectLst/>
+                          <a:latin typeface="Corbel" panose="020B0503020204020204" pitchFamily="34" charset="0"/>
+                          <a:ea typeface="STKaiti"/>
+                          <a:cs typeface="Times New Roman" panose="02020603050405020304" pitchFamily="18" charset="0"/>
+                        </a:rPr>
+                        <a:t>Without Qualifiers</a:t>
+                      </a:r>
+                      <a:endParaRPr lang="en-SG" sz="1000" dirty="0">
+                        <a:effectLst/>
+                        <a:latin typeface="Corbel" panose="020B0503020204020204" pitchFamily="34" charset="0"/>
+                        <a:ea typeface="STKaiti"/>
+                        <a:cs typeface="Times New Roman" panose="02020603050405020304" pitchFamily="18" charset="0"/>
+                      </a:endParaRPr>
+                    </a:p>
+                  </a:txBody>
+                  <a:tcPr marL="68580" marR="68580" marT="0" marB="0">
+                    <a:lnL w="12700" cap="flat" cmpd="sng" algn="ctr">
+                      <a:solidFill>
+                        <a:srgbClr val="000000"/>
+                      </a:solidFill>
+                      <a:prstDash val="solid"/>
+                      <a:round/>
+                      <a:headEnd type="none" w="med" len="med"/>
+                      <a:tailEnd type="none" w="med" len="med"/>
+                    </a:lnL>
+                    <a:lnR w="12700" cap="flat" cmpd="sng" algn="ctr">
+                      <a:solidFill>
+                        <a:srgbClr val="000000"/>
+                      </a:solidFill>
+                      <a:prstDash val="solid"/>
+                      <a:round/>
+                      <a:headEnd type="none" w="med" len="med"/>
+                      <a:tailEnd type="none" w="med" len="med"/>
+                    </a:lnR>
+                    <a:lnT w="12700" cap="flat" cmpd="sng" algn="ctr">
+                      <a:solidFill>
+                        <a:srgbClr val="000000"/>
+                      </a:solidFill>
+                      <a:prstDash val="solid"/>
+                      <a:round/>
+                      <a:headEnd type="none" w="med" len="med"/>
+                      <a:tailEnd type="none" w="med" len="med"/>
+                    </a:lnT>
+                    <a:lnB w="12700" cap="flat" cmpd="sng" algn="ctr">
+                      <a:solidFill>
+                        <a:srgbClr val="000000"/>
+                      </a:solidFill>
+                      <a:prstDash val="solid"/>
+                      <a:round/>
+                      <a:headEnd type="none" w="med" len="med"/>
+                      <a:tailEnd type="none" w="med" len="med"/>
+                    </a:lnB>
+                    <a:solidFill>
+                      <a:srgbClr val="D9D9D9"/>
+                    </a:solidFill>
+                  </a:tcPr>
+                </a:tc>
+                <a:tc>
+                  <a:txBody>
+                    <a:bodyPr/>
+                    <a:lstStyle/>
+                    <a:p>
+                      <a:pPr marL="0" marR="0" lvl="0" indent="0" algn="ctr" defTabSz="584200" rtl="0" eaLnBrk="1" fontAlgn="auto" latinLnBrk="0" hangingPunct="1">
+                        <a:lnSpc>
+                          <a:spcPct val="100000"/>
+                        </a:lnSpc>
+                        <a:spcBef>
+                          <a:spcPts val="0"/>
+                        </a:spcBef>
+                        <a:spcAft>
+                          <a:spcPts val="0"/>
+                        </a:spcAft>
+                        <a:buClrTx/>
+                        <a:buSzTx/>
+                        <a:buFontTx/>
+                        <a:buNone/>
+                        <a:tabLst/>
+                        <a:defRPr/>
+                      </a:pPr>
+                      <a:r>
+                        <a:rPr lang="en-SG" sz="1000" b="1" dirty="0">
+                          <a:effectLst/>
+                          <a:latin typeface="Corbel" panose="020B0503020204020204" pitchFamily="34" charset="0"/>
+                          <a:ea typeface="STKaiti"/>
+                          <a:cs typeface="Times New Roman" panose="02020603050405020304" pitchFamily="18" charset="0"/>
+                        </a:rPr>
+                        <a:t>With Qualifiers</a:t>
+                      </a:r>
+                      <a:endParaRPr lang="en-SG" sz="1000" dirty="0">
+                        <a:effectLst/>
+                        <a:latin typeface="Corbel" panose="020B0503020204020204" pitchFamily="34" charset="0"/>
+                        <a:ea typeface="STKaiti"/>
+                        <a:cs typeface="Times New Roman" panose="02020603050405020304" pitchFamily="18" charset="0"/>
+                      </a:endParaRPr>
+                    </a:p>
+                  </a:txBody>
+                  <a:tcPr marL="68580" marR="68580" marT="0" marB="0">
+                    <a:lnL w="12700" cap="flat" cmpd="sng" algn="ctr">
+                      <a:solidFill>
+                        <a:srgbClr val="000000"/>
+                      </a:solidFill>
+                      <a:prstDash val="solid"/>
+                      <a:round/>
+                      <a:headEnd type="none" w="med" len="med"/>
+                      <a:tailEnd type="none" w="med" len="med"/>
+                    </a:lnL>
+                    <a:lnR w="12700" cap="flat" cmpd="sng" algn="ctr">
+                      <a:solidFill>
+                        <a:srgbClr val="000000"/>
+                      </a:solidFill>
+                      <a:prstDash val="solid"/>
+                      <a:round/>
+                      <a:headEnd type="none" w="med" len="med"/>
+                      <a:tailEnd type="none" w="med" len="med"/>
+                    </a:lnR>
+                    <a:lnB w="12700" cap="flat" cmpd="sng" algn="ctr">
+                      <a:solidFill>
+                        <a:srgbClr val="000000"/>
+                      </a:solidFill>
+                      <a:prstDash val="solid"/>
+                      <a:round/>
+                      <a:headEnd type="none" w="med" len="med"/>
+                      <a:tailEnd type="none" w="med" len="med"/>
+                    </a:lnB>
+                    <a:solidFill>
+                      <a:srgbClr val="D9D9D9"/>
+                    </a:solidFill>
+                  </a:tcPr>
+                </a:tc>
+                <a:tc vMerge="1">
+                  <a:txBody>
+                    <a:bodyPr/>
+                    <a:lstStyle/>
+                    <a:p>
+                      <a:endParaRPr lang="en-SG"/>
+                    </a:p>
+                  </a:txBody>
+                  <a:tcPr/>
+                </a:tc>
+                <a:extLst>
+                  <a:ext uri="{0D108BD9-81ED-4DB2-BD59-A6C34878D82A}">
+                    <a16:rowId xmlns:a16="http://schemas.microsoft.com/office/drawing/2014/main" val="1080260798"/>
+                  </a:ext>
+                </a:extLst>
+              </a:tr>
+              <a:tr h="758952">
                 <a:tc>
                   <a:txBody>
                     <a:bodyPr/>
@@ -3621,7 +3786,7 @@
                     <a:bodyPr/>
                     <a:lstStyle/>
                     <a:p>
-                      <a:pPr>
+                      <a:pPr algn="l">
                         <a:lnSpc>
                           <a:spcPct val="107000"/>
                         </a:lnSpc>
@@ -3636,8 +3801,87 @@
                           <a:ea typeface="STKaiti"/>
                           <a:cs typeface="Times New Roman" panose="02020603050405020304" pitchFamily="18" charset="0"/>
                         </a:rPr>
-                        <a:t>Data File (from Sample)</a:t>
+                        <a:t>Sample</a:t>
                       </a:r>
+                    </a:p>
+                    <a:p>
+                      <a:pPr marL="144000" lvl="0" indent="-108000" algn="l">
+                        <a:lnSpc>
+                          <a:spcPct val="107000"/>
+                        </a:lnSpc>
+                        <a:spcAft>
+                          <a:spcPts val="0"/>
+                        </a:spcAft>
+                        <a:buFont typeface="Symbol" panose="05050102010706020507" pitchFamily="18" charset="2"/>
+                        <a:buChar char=""/>
+                      </a:pPr>
+                      <a:r>
+                        <a:rPr lang="en-SG" sz="900" dirty="0">
+                          <a:effectLst/>
+                          <a:latin typeface="Corbel" panose="020B0503020204020204" pitchFamily="34" charset="0"/>
+                          <a:ea typeface="STKaiti"/>
+                          <a:cs typeface="Times New Roman" panose="02020603050405020304" pitchFamily="18" charset="0"/>
+                        </a:rPr>
+                        <a:t>Data File</a:t>
+                      </a:r>
+                    </a:p>
+                    <a:p>
+                      <a:pPr algn="l">
+                        <a:lnSpc>
+                          <a:spcPct val="107000"/>
+                        </a:lnSpc>
+                        <a:spcAft>
+                          <a:spcPts val="0"/>
+                        </a:spcAft>
+                      </a:pPr>
+                      <a:r>
+                        <a:rPr lang="en-SG" sz="900" dirty="0">
+                          <a:effectLst/>
+                          <a:latin typeface="Corbel" panose="020B0503020204020204" pitchFamily="34" charset="0"/>
+                          <a:ea typeface="STKaiti"/>
+                          <a:cs typeface="Times New Roman" panose="02020603050405020304" pitchFamily="18" charset="0"/>
+                        </a:rPr>
+                        <a:t>Compound Results</a:t>
+                      </a:r>
+                    </a:p>
+                    <a:p>
+                      <a:pPr marL="144000" lvl="0" indent="-108000" algn="l">
+                        <a:lnSpc>
+                          <a:spcPct val="107000"/>
+                        </a:lnSpc>
+                        <a:spcAft>
+                          <a:spcPts val="0"/>
+                        </a:spcAft>
+                        <a:buFont typeface="Symbol" panose="05050102010706020507" pitchFamily="18" charset="2"/>
+                        <a:buChar char=""/>
+                      </a:pPr>
+                      <a:r>
+                        <a:rPr lang="en-SG" sz="900" dirty="0">
+                          <a:effectLst/>
+                          <a:latin typeface="Corbel" panose="020B0503020204020204" pitchFamily="34" charset="0"/>
+                          <a:ea typeface="STKaiti"/>
+                          <a:cs typeface="Times New Roman" panose="02020603050405020304" pitchFamily="18" charset="0"/>
+                        </a:rPr>
+                        <a:t>Area</a:t>
+                      </a:r>
+                    </a:p>
+                    <a:p>
+                      <a:pPr marL="36000" lvl="0" indent="0" algn="l">
+                        <a:lnSpc>
+                          <a:spcPct val="107000"/>
+                        </a:lnSpc>
+                        <a:spcAft>
+                          <a:spcPts val="0"/>
+                        </a:spcAft>
+                        <a:buFont typeface="Symbol" panose="05050102010706020507" pitchFamily="18" charset="2"/>
+                        <a:buNone/>
+                      </a:pPr>
+                      <a:endParaRPr lang="en-SG" sz="900" dirty="0">
+                        <a:effectLst/>
+                        <a:latin typeface="Corbel" panose="020B0503020204020204" pitchFamily="34" charset="0"/>
+                        <a:ea typeface="STKaiti"/>
+                        <a:cs typeface="Times New Roman" panose="02020603050405020304" pitchFamily="18" charset="0"/>
+                      </a:endParaRPr>
                     </a:p>
                   </a:txBody>
                   <a:tcPr marL="68580" marR="68580" marT="0" marB="0">
@@ -3699,7 +3943,113 @@
                           <a:ea typeface="STKaiti"/>
                           <a:cs typeface="Times New Roman" panose="02020603050405020304" pitchFamily="18" charset="0"/>
                         </a:rPr>
-                        <a:t>Quantitation Message (from Sample)</a:t>
+                        <a:t>Qualifier Results</a:t>
+                      </a:r>
+                    </a:p>
+                    <a:p>
+                      <a:pPr marL="144000" lvl="0" indent="-108000" algn="l">
+                        <a:lnSpc>
+                          <a:spcPct val="107000"/>
+                        </a:lnSpc>
+                        <a:spcAft>
+                          <a:spcPts val="0"/>
+                        </a:spcAft>
+                        <a:buFont typeface="Symbol" panose="05050102010706020507" pitchFamily="18" charset="2"/>
+                        <a:buChar char=""/>
+                      </a:pPr>
+                      <a:r>
+                        <a:rPr lang="en-SG" sz="900" dirty="0">
+                          <a:effectLst/>
+                          <a:latin typeface="Corbel" panose="020B0503020204020204" pitchFamily="34" charset="0"/>
+                          <a:ea typeface="STKaiti"/>
+                          <a:cs typeface="Times New Roman" panose="02020603050405020304" pitchFamily="18" charset="0"/>
+                        </a:rPr>
+                        <a:t>Area</a:t>
+                      </a:r>
+                      <a:endParaRPr lang="en-SG" dirty="0"/>
+                    </a:p>
+                  </a:txBody>
+                  <a:tcPr marL="68580" marR="68580" marT="0" marB="0">
+                    <a:lnL w="12700" cap="flat" cmpd="sng" algn="ctr">
+                      <a:solidFill>
+                        <a:srgbClr val="000000"/>
+                      </a:solidFill>
+                      <a:prstDash val="solid"/>
+                      <a:round/>
+                      <a:headEnd type="none" w="med" len="med"/>
+                      <a:tailEnd type="none" w="med" len="med"/>
+                    </a:lnL>
+                    <a:lnR w="12700" cap="flat" cmpd="sng" algn="ctr">
+                      <a:solidFill>
+                        <a:srgbClr val="000000"/>
+                      </a:solidFill>
+                      <a:prstDash val="solid"/>
+                      <a:round/>
+                      <a:headEnd type="none" w="med" len="med"/>
+                      <a:tailEnd type="none" w="med" len="med"/>
+                    </a:lnR>
+                    <a:lnT w="12700" cap="flat" cmpd="sng" algn="ctr">
+                      <a:solidFill>
+                        <a:srgbClr val="000000"/>
+                      </a:solidFill>
+                      <a:prstDash val="solid"/>
+                      <a:round/>
+                      <a:headEnd type="none" w="med" len="med"/>
+                      <a:tailEnd type="none" w="med" len="med"/>
+                    </a:lnT>
+                    <a:lnB w="12700" cap="flat" cmpd="sng" algn="ctr">
+                      <a:solidFill>
+                        <a:srgbClr val="000000"/>
+                      </a:solidFill>
+                      <a:prstDash val="solid"/>
+                      <a:round/>
+                      <a:headEnd type="none" w="med" len="med"/>
+                      <a:tailEnd type="none" w="med" len="med"/>
+                    </a:lnB>
+                  </a:tcPr>
+                </a:tc>
+                <a:tc rowSpan="2">
+                  <a:txBody>
+                    <a:bodyPr/>
+                    <a:lstStyle/>
+                    <a:p>
+                      <a:pPr algn="l">
+                        <a:lnSpc>
+                          <a:spcPct val="107000"/>
+                        </a:lnSpc>
+                        <a:spcAft>
+                          <a:spcPts val="0"/>
+                        </a:spcAft>
+                      </a:pPr>
+                      <a:r>
+                        <a:rPr lang="en-SG" sz="900" dirty="0">
+                          <a:effectLst/>
+                          <a:latin typeface="Corbel" panose="020B0503020204020204" pitchFamily="34" charset="0"/>
+                          <a:ea typeface="STKaiti"/>
+                          <a:cs typeface="Times New Roman" panose="02020603050405020304" pitchFamily="18" charset="0"/>
+                        </a:rPr>
+                        <a:t>Sample </a:t>
+                      </a:r>
+                    </a:p>
+                    <a:p>
+                      <a:pPr marL="144000" lvl="0" indent="-108000" algn="l">
+                        <a:lnSpc>
+                          <a:spcPct val="107000"/>
+                        </a:lnSpc>
+                        <a:spcAft>
+                          <a:spcPts val="0"/>
+                        </a:spcAft>
+                        <a:buFont typeface="Symbol" panose="05050102010706020507" pitchFamily="18" charset="2"/>
+                        <a:buChar char=""/>
+                      </a:pPr>
+                      <a:r>
+                        <a:rPr lang="en-SG" sz="900" dirty="0">
+                          <a:effectLst/>
+                          <a:latin typeface="Corbel" panose="020B0503020204020204" pitchFamily="34" charset="0"/>
+                          <a:ea typeface="STKaiti"/>
+                          <a:cs typeface="Times New Roman" panose="02020603050405020304" pitchFamily="18" charset="0"/>
+                        </a:rPr>
+                        <a:t>Quantification Message</a:t>
                       </a:r>
                     </a:p>
                     <a:p>
@@ -3722,28 +4072,7 @@
                       </a:r>
                     </a:p>
                     <a:p>
-                      <a:pPr marL="216000" lvl="0" indent="-108000" algn="l">
-                        <a:lnSpc>
-                          <a:spcPct val="107000"/>
-                        </a:lnSpc>
-                        <a:spcAft>
-                          <a:spcPts val="0"/>
-                        </a:spcAft>
-                        <a:buFont typeface="Symbol" panose="05050102010706020507" pitchFamily="18" charset="2"/>
-                        <a:buChar char=""/>
-                      </a:pPr>
-                      <a:r>
-                        <a:rPr lang="en-SG" sz="900" dirty="0">
-                          <a:effectLst/>
-                          <a:latin typeface="Corbel" panose="020B0503020204020204" pitchFamily="34" charset="0"/>
-                          <a:ea typeface="STKaiti"/>
-                          <a:cs typeface="Times New Roman" panose="02020603050405020304" pitchFamily="18" charset="0"/>
-                        </a:rPr>
-                        <a:t>Qualifier Methods</a:t>
-                      </a:r>
-                    </a:p>
-                    <a:p>
-                      <a:pPr marL="216000" lvl="0" indent="-108000" algn="l">
+                      <a:pPr marL="144000" lvl="0" indent="-108000" algn="l">
                         <a:lnSpc>
                           <a:spcPct val="107000"/>
                         </a:lnSpc>
@@ -3764,7 +4093,7 @@
                       </a:r>
                     </a:p>
                     <a:p>
-                      <a:pPr marL="216000" lvl="0" indent="-108000" algn="l">
+                      <a:pPr marL="144000" lvl="0" indent="-108000" algn="l">
                         <a:lnSpc>
                           <a:spcPct val="107000"/>
                         </a:lnSpc>
@@ -3830,70 +4159,7 @@
                   </a:ext>
                 </a:extLst>
               </a:tr>
-              <a:tr h="697230">
-                <a:tc>
-                  <a:txBody>
-                    <a:bodyPr/>
-                    <a:lstStyle/>
-                    <a:p>
-                      <a:pPr>
-                        <a:lnSpc>
-                          <a:spcPct val="107000"/>
-                        </a:lnSpc>
-                        <a:spcAft>
-                          <a:spcPts val="0"/>
-                        </a:spcAft>
-                      </a:pPr>
-                      <a:r>
-                        <a:rPr lang="en-SG" sz="900">
-                          <a:effectLst/>
-                          <a:latin typeface="Corbel" panose="020B0503020204020204" pitchFamily="34" charset="0"/>
-                          <a:ea typeface="STKaiti"/>
-                          <a:cs typeface="Times New Roman" panose="02020603050405020304" pitchFamily="18" charset="0"/>
-                        </a:rPr>
-                        <a:t>Agilent’s CompoundTable form</a:t>
-                      </a:r>
-                    </a:p>
-                  </a:txBody>
-                  <a:tcPr marL="68580" marR="68580" marT="0" marB="0">
-                    <a:lnL w="12700" cap="flat" cmpd="sng" algn="ctr">
-                      <a:solidFill>
-                        <a:srgbClr val="000000"/>
-                      </a:solidFill>
-                      <a:prstDash val="solid"/>
-                      <a:round/>
-                      <a:headEnd type="none" w="med" len="med"/>
-                      <a:tailEnd type="none" w="med" len="med"/>
-                    </a:lnL>
-                    <a:lnR w="12700" cap="flat" cmpd="sng" algn="ctr">
-                      <a:solidFill>
-                        <a:srgbClr val="000000"/>
-                      </a:solidFill>
-                      <a:prstDash val="solid"/>
-                      <a:round/>
-                      <a:headEnd type="none" w="med" len="med"/>
-                      <a:tailEnd type="none" w="med" len="med"/>
-                    </a:lnR>
-                    <a:lnT w="12700" cap="flat" cmpd="sng" algn="ctr">
-                      <a:solidFill>
-                        <a:srgbClr val="000000"/>
-                      </a:solidFill>
-                      <a:prstDash val="solid"/>
-                      <a:round/>
-                      <a:headEnd type="none" w="med" len="med"/>
-                      <a:tailEnd type="none" w="med" len="med"/>
-                    </a:lnT>
-                    <a:lnB w="12700" cap="flat" cmpd="sng" algn="ctr">
-                      <a:solidFill>
-                        <a:srgbClr val="000000"/>
-                      </a:solidFill>
-                      <a:prstDash val="solid"/>
-                      <a:round/>
-                      <a:headEnd type="none" w="med" len="med"/>
-                      <a:tailEnd type="none" w="med" len="med"/>
-                    </a:lnB>
-                  </a:tcPr>
-                </a:tc>
+              <a:tr h="912093">
                 <a:tc>
                   <a:txBody>
                     <a:bodyPr/>
@@ -3914,18 +4180,17 @@
                           <a:ea typeface="STKaiti"/>
                           <a:cs typeface="Times New Roman" panose="02020603050405020304" pitchFamily="18" charset="0"/>
                         </a:rPr>
-                        <a:t>Name (from Compound Method)</a:t>
+                        <a:t>Agilent’s </a:t>
                       </a:r>
-                    </a:p>
-                    <a:p>
-                      <a:pPr>
-                        <a:lnSpc>
-                          <a:spcPct val="107000"/>
-                        </a:lnSpc>
-                        <a:spcAft>
-                          <a:spcPts val="0"/>
-                        </a:spcAft>
-                      </a:pPr>
+                      <a:r>
+                        <a:rPr lang="en-SG" sz="900" dirty="0" err="1">
+                          <a:effectLst/>
+                          <a:latin typeface="Corbel" panose="020B0503020204020204" pitchFamily="34" charset="0"/>
+                          <a:ea typeface="STKaiti"/>
+                          <a:cs typeface="Times New Roman" panose="02020603050405020304" pitchFamily="18" charset="0"/>
+                        </a:rPr>
+                        <a:t>CompoundTable</a:t>
+                      </a:r>
                       <a:r>
                         <a:rPr lang="en-SG" sz="900" dirty="0">
                           <a:effectLst/>
@@ -3933,7 +4198,7 @@
                           <a:ea typeface="STKaiti"/>
                           <a:cs typeface="Times New Roman" panose="02020603050405020304" pitchFamily="18" charset="0"/>
                         </a:rPr>
-                        <a:t>Data File (from Sample)</a:t>
+                        <a:t> form</a:t>
                       </a:r>
                     </a:p>
                   </a:txBody>
@@ -3996,7 +4261,28 @@
                           <a:ea typeface="STKaiti"/>
                           <a:cs typeface="Times New Roman" panose="02020603050405020304" pitchFamily="18" charset="0"/>
                         </a:rPr>
-                        <a:t>Quantitation Message (from Sample)</a:t>
+                        <a:t>Sample</a:t>
+                      </a:r>
+                    </a:p>
+                    <a:p>
+                      <a:pPr marL="144000" lvl="0" indent="-108000" algn="l">
+                        <a:lnSpc>
+                          <a:spcPct val="107000"/>
+                        </a:lnSpc>
+                        <a:spcAft>
+                          <a:spcPts val="0"/>
+                        </a:spcAft>
+                        <a:buFont typeface="Symbol" panose="05050102010706020507" pitchFamily="18" charset="2"/>
+                        <a:buChar char=""/>
+                      </a:pPr>
+                      <a:r>
+                        <a:rPr lang="en-SG" sz="900" dirty="0">
+                          <a:effectLst/>
+                          <a:latin typeface="Corbel" panose="020B0503020204020204" pitchFamily="34" charset="0"/>
+                          <a:ea typeface="STKaiti"/>
+                          <a:cs typeface="Times New Roman" panose="02020603050405020304" pitchFamily="18" charset="0"/>
+                        </a:rPr>
+                        <a:t>Data File</a:t>
                       </a:r>
                     </a:p>
                     <a:p>
@@ -4015,11 +4301,11 @@
                           <a:ea typeface="STKaiti"/>
                           <a:cs typeface="Times New Roman" panose="02020603050405020304" pitchFamily="18" charset="0"/>
                         </a:rPr>
-                        <a:t>Columns from </a:t>
+                        <a:t>Compound Method</a:t>
                       </a:r>
                     </a:p>
                     <a:p>
-                      <a:pPr marL="216000" lvl="0" indent="-108000" algn="l">
+                      <a:pPr marL="144000" lvl="0" indent="-108000" algn="l">
                         <a:lnSpc>
                           <a:spcPct val="107000"/>
                         </a:lnSpc>
@@ -4036,11 +4322,30 @@
                           <a:ea typeface="STKaiti"/>
                           <a:cs typeface="Times New Roman" panose="02020603050405020304" pitchFamily="18" charset="0"/>
                         </a:rPr>
-                        <a:t>Qualifier Methods</a:t>
+                        <a:t>Name</a:t>
                       </a:r>
                     </a:p>
                     <a:p>
-                      <a:pPr marL="216000" lvl="0" indent="-108000" algn="l">
+                      <a:pPr algn="l">
+                        <a:lnSpc>
+                          <a:spcPct val="107000"/>
+                        </a:lnSpc>
+                        <a:spcAft>
+                          <a:spcPts val="0"/>
+                        </a:spcAft>
+                      </a:pPr>
+                      <a:r>
+                        <a:rPr lang="en-SG" sz="900" dirty="0">
+                          <a:effectLst/>
+                          <a:latin typeface="Corbel" panose="020B0503020204020204" pitchFamily="34" charset="0"/>
+                          <a:ea typeface="STKaiti"/>
+                          <a:cs typeface="Times New Roman" panose="02020603050405020304" pitchFamily="18" charset="0"/>
+                        </a:rPr>
+                        <a:t>Compound Results</a:t>
+                      </a:r>
+                    </a:p>
+                    <a:p>
+                      <a:pPr marL="144000" lvl="0" indent="-108000" algn="l">
                         <a:lnSpc>
                           <a:spcPct val="107000"/>
                         </a:lnSpc>
@@ -4057,11 +4362,74 @@
                           <a:ea typeface="STKaiti"/>
                           <a:cs typeface="Times New Roman" panose="02020603050405020304" pitchFamily="18" charset="0"/>
                         </a:rPr>
-                        <a:t>Qualifier Results</a:t>
+                        <a:t>Area</a:t>
+                      </a:r>
+                    </a:p>
+                  </a:txBody>
+                  <a:tcPr marL="68580" marR="68580" marT="0" marB="0">
+                    <a:lnL w="12700" cap="flat" cmpd="sng" algn="ctr">
+                      <a:solidFill>
+                        <a:srgbClr val="000000"/>
+                      </a:solidFill>
+                      <a:prstDash val="solid"/>
+                      <a:round/>
+                      <a:headEnd type="none" w="med" len="med"/>
+                      <a:tailEnd type="none" w="med" len="med"/>
+                    </a:lnL>
+                    <a:lnR w="12700" cap="flat" cmpd="sng" algn="ctr">
+                      <a:solidFill>
+                        <a:srgbClr val="000000"/>
+                      </a:solidFill>
+                      <a:prstDash val="solid"/>
+                      <a:round/>
+                      <a:headEnd type="none" w="med" len="med"/>
+                      <a:tailEnd type="none" w="med" len="med"/>
+                    </a:lnR>
+                    <a:lnT w="12700" cap="flat" cmpd="sng" algn="ctr">
+                      <a:solidFill>
+                        <a:srgbClr val="000000"/>
+                      </a:solidFill>
+                      <a:prstDash val="solid"/>
+                      <a:round/>
+                      <a:headEnd type="none" w="med" len="med"/>
+                      <a:tailEnd type="none" w="med" len="med"/>
+                    </a:lnT>
+                    <a:lnB w="12700" cap="flat" cmpd="sng" algn="ctr">
+                      <a:solidFill>
+                        <a:srgbClr val="000000"/>
+                      </a:solidFill>
+                      <a:prstDash val="solid"/>
+                      <a:round/>
+                      <a:headEnd type="none" w="med" len="med"/>
+                      <a:tailEnd type="none" w="med" len="med"/>
+                    </a:lnB>
+                  </a:tcPr>
+                </a:tc>
+                <a:tc>
+                  <a:txBody>
+                    <a:bodyPr/>
+                    <a:lstStyle/>
+                    <a:p>
+                      <a:pPr algn="l">
+                        <a:lnSpc>
+                          <a:spcPct val="107000"/>
+                        </a:lnSpc>
+                        <a:spcAft>
+                          <a:spcPts val="0"/>
+                        </a:spcAft>
+                      </a:pPr>
+                      <a:r>
+                        <a:rPr lang="en-SG" sz="900" dirty="0">
+                          <a:effectLst/>
+                          <a:latin typeface="Corbel" panose="020B0503020204020204" pitchFamily="34" charset="0"/>
+                          <a:ea typeface="STKaiti"/>
+                          <a:cs typeface="Times New Roman" panose="02020603050405020304" pitchFamily="18" charset="0"/>
+                        </a:rPr>
+                        <a:t>Qualifier Method</a:t>
                       </a:r>
                     </a:p>
                     <a:p>
-                      <a:pPr marL="216000" lvl="0" indent="-108000" algn="l">
+                      <a:pPr marL="144000" lvl="0" indent="-108000" algn="l">
                         <a:lnSpc>
                           <a:spcPct val="107000"/>
                         </a:lnSpc>
@@ -4078,11 +4446,30 @@
                           <a:ea typeface="STKaiti"/>
                           <a:cs typeface="Times New Roman" panose="02020603050405020304" pitchFamily="18" charset="0"/>
                         </a:rPr>
-                        <a:t>ISTD Compound Methods</a:t>
+                        <a:t>Transition</a:t>
                       </a:r>
                     </a:p>
                     <a:p>
-                      <a:pPr marL="216000" lvl="0" indent="-108000" algn="l">
+                      <a:pPr algn="l">
+                        <a:lnSpc>
+                          <a:spcPct val="107000"/>
+                        </a:lnSpc>
+                        <a:spcAft>
+                          <a:spcPts val="0"/>
+                        </a:spcAft>
+                      </a:pPr>
+                      <a:r>
+                        <a:rPr lang="en-SG" sz="900" dirty="0">
+                          <a:effectLst/>
+                          <a:latin typeface="Corbel" panose="020B0503020204020204" pitchFamily="34" charset="0"/>
+                          <a:ea typeface="STKaiti"/>
+                          <a:cs typeface="Times New Roman" panose="02020603050405020304" pitchFamily="18" charset="0"/>
+                        </a:rPr>
+                        <a:t>Qualifier Results</a:t>
+                      </a:r>
+                    </a:p>
+                    <a:p>
+                      <a:pPr marL="144000" lvl="0" indent="-108000" algn="l">
                         <a:lnSpc>
                           <a:spcPct val="107000"/>
                         </a:lnSpc>
@@ -4099,8 +4486,88 @@
                           <a:ea typeface="STKaiti"/>
                           <a:cs typeface="Times New Roman" panose="02020603050405020304" pitchFamily="18" charset="0"/>
                         </a:rPr>
-                        <a:t>ISTD Compound Results</a:t>
+                        <a:t>Area</a:t>
                       </a:r>
+                    </a:p>
+                    <a:p>
+                      <a:pPr marL="36000" lvl="0" indent="0" algn="l">
+                        <a:lnSpc>
+                          <a:spcPct val="107000"/>
+                        </a:lnSpc>
+                        <a:spcAft>
+                          <a:spcPts val="0"/>
+                        </a:spcAft>
+                        <a:buFont typeface="Symbol" panose="05050102010706020507" pitchFamily="18" charset="2"/>
+                        <a:buNone/>
+                      </a:pPr>
+                      <a:endParaRPr lang="en-SG" sz="900" dirty="0">
+                        <a:effectLst/>
+                        <a:latin typeface="Corbel" panose="020B0503020204020204" pitchFamily="34" charset="0"/>
+                        <a:ea typeface="STKaiti"/>
+                        <a:cs typeface="Times New Roman" panose="02020603050405020304" pitchFamily="18" charset="0"/>
+                      </a:endParaRPr>
+                    </a:p>
+                  </a:txBody>
+                  <a:tcPr marL="68580" marR="68580" marT="0" marB="0">
+                    <a:lnL w="12700" cap="flat" cmpd="sng" algn="ctr">
+                      <a:solidFill>
+                        <a:srgbClr val="000000"/>
+                      </a:solidFill>
+                      <a:prstDash val="solid"/>
+                      <a:round/>
+                      <a:headEnd type="none" w="med" len="med"/>
+                      <a:tailEnd type="none" w="med" len="med"/>
+                    </a:lnL>
+                    <a:lnR w="12700" cap="flat" cmpd="sng" algn="ctr">
+                      <a:solidFill>
+                        <a:srgbClr val="000000"/>
+                      </a:solidFill>
+                      <a:prstDash val="solid"/>
+                      <a:round/>
+                      <a:headEnd type="none" w="med" len="med"/>
+                      <a:tailEnd type="none" w="med" len="med"/>
+                    </a:lnR>
+                    <a:lnT w="12700" cap="flat" cmpd="sng" algn="ctr">
+                      <a:solidFill>
+                        <a:srgbClr val="000000"/>
+                      </a:solidFill>
+                      <a:prstDash val="solid"/>
+                      <a:round/>
+                      <a:headEnd type="none" w="med" len="med"/>
+                      <a:tailEnd type="none" w="med" len="med"/>
+                    </a:lnT>
+                    <a:lnB w="12700" cap="flat" cmpd="sng" algn="ctr">
+                      <a:solidFill>
+                        <a:srgbClr val="000000"/>
+                      </a:solidFill>
+                      <a:prstDash val="solid"/>
+                      <a:round/>
+                      <a:headEnd type="none" w="med" len="med"/>
+                      <a:tailEnd type="none" w="med" len="med"/>
+                    </a:lnB>
+                  </a:tcPr>
+                </a:tc>
+                <a:tc vMerge="1">
+                  <a:txBody>
+                    <a:bodyPr/>
+                    <a:lstStyle/>
+                    <a:p>
+                      <a:pPr marL="108000" lvl="0" indent="0" algn="l">
+                        <a:lnSpc>
+                          <a:spcPct val="107000"/>
+                        </a:lnSpc>
+                        <a:spcAft>
+                          <a:spcPts val="0"/>
+                        </a:spcAft>
+                        <a:buFont typeface="Symbol" panose="05050102010706020507" pitchFamily="18" charset="2"/>
+                        <a:buNone/>
+                      </a:pPr>
+                      <a:endParaRPr lang="en-SG" sz="900" dirty="0">
+                        <a:effectLst/>
+                        <a:latin typeface="Corbel" panose="020B0503020204020204" pitchFamily="34" charset="0"/>
+                        <a:ea typeface="STKaiti"/>
+                        <a:cs typeface="Times New Roman" panose="02020603050405020304" pitchFamily="18" charset="0"/>
+                      </a:endParaRPr>
                     </a:p>
                   </a:txBody>
                   <a:tcPr marL="68580" marR="68580" marT="0" marB="0">
@@ -4144,7 +4611,7 @@
                 </a:tc>
                 <a:extLst>
                   <a:ext uri="{0D108BD9-81ED-4DB2-BD59-A6C34878D82A}">
-                    <a16:rowId xmlns:a16="http://schemas.microsoft.com/office/drawing/2014/main" val="402862090"/>
+                    <a16:rowId xmlns:a16="http://schemas.microsoft.com/office/drawing/2014/main" val="2015100388"/>
                   </a:ext>
                 </a:extLst>
               </a:tr>
@@ -4152,28 +4619,6 @@
           </a:graphicData>
         </a:graphic>
       </p:graphicFrame>
-      <p:pic>
-        <p:nvPicPr>
-          <p:cNvPr id="273" name="Picture 272"/>
-          <p:cNvPicPr/>
-          <p:nvPr/>
-        </p:nvPicPr>
-        <p:blipFill>
-          <a:blip r:embed="rId2"/>
-          <a:stretch>
-            <a:fillRect/>
-          </a:stretch>
-        </p:blipFill>
-        <p:spPr>
-          <a:xfrm>
-            <a:off x="254498" y="4047332"/>
-            <a:ext cx="4512087" cy="759804"/>
-          </a:xfrm>
-          <a:prstGeom prst="rect">
-            <a:avLst/>
-          </a:prstGeom>
-        </p:spPr>
-      </p:pic>
       <p:sp>
         <p:nvSpPr>
           <p:cNvPr id="274" name="ICONS"/>
@@ -4182,7 +4627,7 @@
         </p:nvSpPr>
         <p:spPr>
           <a:xfrm>
-            <a:off x="263781" y="3801162"/>
+            <a:off x="272923" y="4087267"/>
             <a:ext cx="657231" cy="210314"/>
           </a:xfrm>
           <a:prstGeom prst="rect">
@@ -4193,7 +4638,7 @@
           </a:ln>
           <a:extLst>
             <a:ext uri="{C572A759-6A51-4108-AA02-DFA0A04FC94B}">
-              <ma14:wrappingTextBoxFlag xmlns:ma14="http://schemas.microsoft.com/office/mac/drawingml/2011/main" xmlns="" val="1"/>
+              <ma14:wrappingTextBoxFlag xmlns="" xmlns:ma14="http://schemas.microsoft.com/office/mac/drawingml/2011/main" val="1"/>
             </a:ext>
           </a:extLst>
         </p:spPr>
@@ -4231,7 +4676,7 @@
           </a:ln>
           <a:extLst>
             <a:ext uri="{C572A759-6A51-4108-AA02-DFA0A04FC94B}">
-              <ma14:wrappingTextBoxFlag xmlns:ma14="http://schemas.microsoft.com/office/mac/drawingml/2011/main" xmlns="" val="1"/>
+              <ma14:wrappingTextBoxFlag xmlns="" xmlns:ma14="http://schemas.microsoft.com/office/mac/drawingml/2011/main" val="1"/>
             </a:ext>
           </a:extLst>
         </p:spPr>
@@ -4256,15 +4701,7 @@
             </a:pPr>
             <a:r>
               <a:rPr lang="en-SG" dirty="0"/>
-              <a:t>Transition Name Annotation (</a:t>
-            </a:r>
-            <a:r>
-              <a:rPr lang="en-SG" dirty="0" err="1"/>
-              <a:t>cont</a:t>
-            </a:r>
-            <a:r>
-              <a:rPr lang="en-SG" dirty="0"/>
-              <a:t>)</a:t>
+              <a:t>Transition Name Annotation</a:t>
             </a:r>
             <a:endParaRPr dirty="0"/>
           </a:p>
@@ -4278,8 +4715,8 @@
         </p:nvSpPr>
         <p:spPr>
           <a:xfrm flipV="1">
-            <a:off x="4896378" y="1024465"/>
-            <a:ext cx="8985314" cy="1799"/>
+            <a:off x="0" y="1016734"/>
+            <a:ext cx="13963719" cy="48592"/>
           </a:xfrm>
           <a:prstGeom prst="line">
             <a:avLst/>
@@ -4320,7 +4757,7 @@
         </p:nvSpPr>
         <p:spPr>
           <a:xfrm>
-            <a:off x="5039997" y="1463325"/>
+            <a:off x="5079918" y="2915531"/>
             <a:ext cx="721351" cy="210314"/>
           </a:xfrm>
           <a:prstGeom prst="rect">
@@ -4331,7 +4768,7 @@
           </a:ln>
           <a:extLst>
             <a:ext uri="{C572A759-6A51-4108-AA02-DFA0A04FC94B}">
-              <ma14:wrappingTextBoxFlag xmlns:ma14="http://schemas.microsoft.com/office/mac/drawingml/2011/main" xmlns="" val="1"/>
+              <ma14:wrappingTextBoxFlag xmlns="" xmlns:ma14="http://schemas.microsoft.com/office/mac/drawingml/2011/main" val="1"/>
             </a:ext>
           </a:extLst>
         </p:spPr>
@@ -4358,7 +4795,7 @@
         </p:nvSpPr>
         <p:spPr>
           <a:xfrm>
-            <a:off x="5003917" y="1676835"/>
+            <a:off x="5156317" y="3174176"/>
             <a:ext cx="1963608" cy="442605"/>
           </a:xfrm>
           <a:prstGeom prst="rect">
@@ -4369,7 +4806,7 @@
           </a:ln>
           <a:extLst>
             <a:ext uri="{C572A759-6A51-4108-AA02-DFA0A04FC94B}">
-              <ma14:wrappingTextBoxFlag xmlns:ma14="http://schemas.microsoft.com/office/mac/drawingml/2011/main" xmlns="" val="1"/>
+              <ma14:wrappingTextBoxFlag xmlns="" xmlns:ma14="http://schemas.microsoft.com/office/mac/drawingml/2011/main" val="1"/>
             </a:ext>
           </a:extLst>
         </p:spPr>
@@ -4429,7 +4866,7 @@
         </p:nvSpPr>
         <p:spPr>
           <a:xfrm>
-            <a:off x="7393103" y="1470486"/>
+            <a:off x="7393103" y="2924012"/>
             <a:ext cx="1966885" cy="210314"/>
           </a:xfrm>
           <a:prstGeom prst="rect">
@@ -4440,7 +4877,7 @@
           </a:ln>
           <a:extLst>
             <a:ext uri="{C572A759-6A51-4108-AA02-DFA0A04FC94B}">
-              <ma14:wrappingTextBoxFlag xmlns:ma14="http://schemas.microsoft.com/office/mac/drawingml/2011/main" xmlns="" val="1"/>
+              <ma14:wrappingTextBoxFlag xmlns="" xmlns:ma14="http://schemas.microsoft.com/office/mac/drawingml/2011/main" val="1"/>
             </a:ext>
           </a:extLst>
         </p:spPr>
@@ -4467,7 +4904,7 @@
         </p:nvSpPr>
         <p:spPr>
           <a:xfrm>
-            <a:off x="7362618" y="1676884"/>
+            <a:off x="7362618" y="3130410"/>
             <a:ext cx="2297144" cy="608804"/>
           </a:xfrm>
           <a:prstGeom prst="rect">
@@ -4478,7 +4915,7 @@
           </a:ln>
           <a:extLst>
             <a:ext uri="{C572A759-6A51-4108-AA02-DFA0A04FC94B}">
-              <ma14:wrappingTextBoxFlag xmlns:ma14="http://schemas.microsoft.com/office/mac/drawingml/2011/main" xmlns="" val="1"/>
+              <ma14:wrappingTextBoxFlag xmlns="" xmlns:ma14="http://schemas.microsoft.com/office/mac/drawingml/2011/main" val="1"/>
             </a:ext>
           </a:extLst>
         </p:spPr>
@@ -4557,7 +4994,7 @@
         </p:nvSpPr>
         <p:spPr>
           <a:xfrm>
-            <a:off x="263781" y="1462822"/>
+            <a:off x="263781" y="1519973"/>
             <a:ext cx="2386872" cy="210314"/>
           </a:xfrm>
           <a:prstGeom prst="rect">
@@ -4568,7 +5005,7 @@
           </a:ln>
           <a:extLst>
             <a:ext uri="{C572A759-6A51-4108-AA02-DFA0A04FC94B}">
-              <ma14:wrappingTextBoxFlag xmlns:ma14="http://schemas.microsoft.com/office/mac/drawingml/2011/main" xmlns="" val="1"/>
+              <ma14:wrappingTextBoxFlag xmlns="" xmlns:ma14="http://schemas.microsoft.com/office/mac/drawingml/2011/main" val="1"/>
             </a:ext>
           </a:extLst>
         </p:spPr>
@@ -4587,36 +5024,6 @@
           </a:p>
         </p:txBody>
       </p:sp>
-      <p:pic>
-        <p:nvPicPr>
-          <p:cNvPr id="19" name="Picture 18">
-            <a:extLst>
-              <a:ext uri="{FF2B5EF4-FFF2-40B4-BE49-F238E27FC236}">
-                <a16:creationId xmlns:a16="http://schemas.microsoft.com/office/drawing/2014/main" id="{043A0BD0-3B02-4BEC-BE20-9E259415AB11}"/>
-              </a:ext>
-            </a:extLst>
-          </p:cNvPr>
-          <p:cNvPicPr>
-            <a:picLocks noChangeAspect="1"/>
-          </p:cNvPicPr>
-          <p:nvPr/>
-        </p:nvPicPr>
-        <p:blipFill>
-          <a:blip r:embed="rId3"/>
-          <a:stretch>
-            <a:fillRect/>
-          </a:stretch>
-        </p:blipFill>
-        <p:spPr>
-          <a:xfrm>
-            <a:off x="257147" y="4929270"/>
-            <a:ext cx="4512087" cy="794382"/>
-          </a:xfrm>
-          <a:prstGeom prst="rect">
-            <a:avLst/>
-          </a:prstGeom>
-        </p:spPr>
-      </p:pic>
       <p:sp>
         <p:nvSpPr>
           <p:cNvPr id="60" name="Basics">
@@ -4631,7 +5038,7 @@
         </p:nvSpPr>
         <p:spPr>
           <a:xfrm>
-            <a:off x="277924" y="6004533"/>
+            <a:off x="277924" y="8247667"/>
             <a:ext cx="2526333" cy="340029"/>
           </a:xfrm>
           <a:prstGeom prst="rect">
@@ -4642,7 +5049,7 @@
           </a:ln>
           <a:extLst>
             <a:ext uri="{C572A759-6A51-4108-AA02-DFA0A04FC94B}">
-              <ma14:wrappingTextBoxFlag xmlns:ma14="http://schemas.microsoft.com/office/mac/drawingml/2011/main" xmlns="" val="1"/>
+              <ma14:wrappingTextBoxFlag xmlns="" xmlns:ma14="http://schemas.microsoft.com/office/mac/drawingml/2011/main" val="1"/>
             </a:ext>
           </a:extLst>
         </p:spPr>
@@ -4686,9 +5093,9 @@
           <p:nvPr/>
         </p:nvSpPr>
         <p:spPr>
-          <a:xfrm>
-            <a:off x="273163" y="5925178"/>
-            <a:ext cx="4671788" cy="0"/>
+          <a:xfrm flipV="1">
+            <a:off x="40516" y="8111161"/>
+            <a:ext cx="4904435" cy="12456"/>
           </a:xfrm>
           <a:prstGeom prst="line">
             <a:avLst/>
@@ -4735,7 +5142,7 @@
         </p:nvSpPr>
         <p:spPr>
           <a:xfrm>
-            <a:off x="284949" y="6375028"/>
+            <a:off x="284949" y="8618162"/>
             <a:ext cx="657231" cy="210314"/>
           </a:xfrm>
           <a:prstGeom prst="rect">
@@ -4746,7 +5153,7 @@
           </a:ln>
           <a:extLst>
             <a:ext uri="{C572A759-6A51-4108-AA02-DFA0A04FC94B}">
-              <ma14:wrappingTextBoxFlag xmlns:ma14="http://schemas.microsoft.com/office/mac/drawingml/2011/main" xmlns="" val="1"/>
+              <ma14:wrappingTextBoxFlag xmlns="" xmlns:ma14="http://schemas.microsoft.com/office/mac/drawingml/2011/main" val="1"/>
             </a:ext>
           </a:extLst>
         </p:spPr>
@@ -4780,13 +5187,13 @@
           <p:nvPr/>
         </p:nvPicPr>
         <p:blipFill rotWithShape="1">
-          <a:blip r:embed="rId4"/>
+          <a:blip r:embed="rId2"/>
           <a:srcRect b="22956"/>
           <a:stretch/>
         </p:blipFill>
         <p:spPr>
           <a:xfrm>
-            <a:off x="273163" y="6975565"/>
+            <a:off x="273163" y="9218699"/>
             <a:ext cx="1718436" cy="970494"/>
           </a:xfrm>
           <a:prstGeom prst="rect">
@@ -4809,14 +5216,14 @@
           <p:nvPr/>
         </p:nvPicPr>
         <p:blipFill>
-          <a:blip r:embed="rId5"/>
+          <a:blip r:embed="rId3"/>
           <a:stretch>
             <a:fillRect/>
           </a:stretch>
         </p:blipFill>
         <p:spPr>
           <a:xfrm>
-            <a:off x="2248145" y="6959869"/>
+            <a:off x="2248145" y="9203003"/>
             <a:ext cx="2526332" cy="510125"/>
           </a:xfrm>
           <a:prstGeom prst="rect">
@@ -4838,7 +5245,7 @@
         </p:nvSpPr>
         <p:spPr>
           <a:xfrm>
-            <a:off x="256671" y="6560239"/>
+            <a:off x="256671" y="8803373"/>
             <a:ext cx="1718436" cy="414905"/>
           </a:xfrm>
           <a:prstGeom prst="rect">
@@ -4849,7 +5256,7 @@
           </a:ln>
           <a:extLst>
             <a:ext uri="{C572A759-6A51-4108-AA02-DFA0A04FC94B}">
-              <ma14:wrappingTextBoxFlag xmlns:ma14="http://schemas.microsoft.com/office/mac/drawingml/2011/main" xmlns="" val="1"/>
+              <ma14:wrappingTextBoxFlag xmlns="" xmlns:ma14="http://schemas.microsoft.com/office/mac/drawingml/2011/main" val="1"/>
             </a:ext>
           </a:extLst>
         </p:spPr>
@@ -4928,7 +5335,7 @@
         </p:nvSpPr>
         <p:spPr>
           <a:xfrm>
-            <a:off x="2257669" y="6604982"/>
+            <a:off x="2257669" y="8848116"/>
             <a:ext cx="2526333" cy="262555"/>
           </a:xfrm>
           <a:prstGeom prst="rect">
@@ -4939,7 +5346,7 @@
           </a:ln>
           <a:extLst>
             <a:ext uri="{C572A759-6A51-4108-AA02-DFA0A04FC94B}">
-              <ma14:wrappingTextBoxFlag xmlns:ma14="http://schemas.microsoft.com/office/mac/drawingml/2011/main" xmlns="" val="1"/>
+              <ma14:wrappingTextBoxFlag xmlns="" xmlns:ma14="http://schemas.microsoft.com/office/mac/drawingml/2011/main" val="1"/>
             </a:ext>
           </a:extLst>
         </p:spPr>
@@ -5020,7 +5427,7 @@
           </a:ln>
           <a:extLst>
             <a:ext uri="{C572A759-6A51-4108-AA02-DFA0A04FC94B}">
-              <ma14:wrappingTextBoxFlag xmlns:ma14="http://schemas.microsoft.com/office/mac/drawingml/2011/main" xmlns="" val="1"/>
+              <ma14:wrappingTextBoxFlag xmlns="" xmlns:ma14="http://schemas.microsoft.com/office/mac/drawingml/2011/main" val="1"/>
             </a:ext>
           </a:extLst>
         </p:spPr>
@@ -5092,110 +5499,6 @@
       </p:sp>
       <p:sp>
         <p:nvSpPr>
-          <p:cNvPr id="85" name="Line">
-            <a:extLst>
-              <a:ext uri="{FF2B5EF4-FFF2-40B4-BE49-F238E27FC236}">
-                <a16:creationId xmlns:a16="http://schemas.microsoft.com/office/drawing/2014/main" id="{CFDC8BBB-6810-457D-BA07-69770FEEFF83}"/>
-              </a:ext>
-            </a:extLst>
-          </p:cNvPr>
-          <p:cNvSpPr/>
-          <p:nvPr/>
-        </p:nvSpPr>
-        <p:spPr>
-          <a:xfrm flipV="1">
-            <a:off x="133340" y="8064254"/>
-            <a:ext cx="4756756" cy="13649"/>
-          </a:xfrm>
-          <a:prstGeom prst="line">
-            <a:avLst/>
-          </a:prstGeom>
-          <a:ln w="3175">
-            <a:solidFill>
-              <a:srgbClr val="767C85"/>
-            </a:solidFill>
-            <a:miter lim="400000"/>
-          </a:ln>
-        </p:spPr>
-        <p:txBody>
-          <a:bodyPr lIns="54570" tIns="54570" rIns="54570" bIns="54570" anchor="ctr"/>
-          <a:lstStyle/>
-          <a:p>
-            <a:pPr>
-              <a:lnSpc>
-                <a:spcPct val="80000"/>
-              </a:lnSpc>
-              <a:spcBef>
-                <a:spcPts val="600"/>
-              </a:spcBef>
-              <a:defRPr b="0">
-                <a:solidFill>
-                  <a:srgbClr val="000000"/>
-                </a:solidFill>
-              </a:defRPr>
-            </a:pPr>
-            <a:endParaRPr/>
-          </a:p>
-        </p:txBody>
-      </p:sp>
-      <p:sp>
-        <p:nvSpPr>
-          <p:cNvPr id="86" name="Useful Elements">
-            <a:extLst>
-              <a:ext uri="{FF2B5EF4-FFF2-40B4-BE49-F238E27FC236}">
-                <a16:creationId xmlns:a16="http://schemas.microsoft.com/office/drawing/2014/main" id="{789AF98A-8865-468A-AF50-7B5E4867C57D}"/>
-              </a:ext>
-            </a:extLst>
-          </p:cNvPr>
-          <p:cNvSpPr txBox="1"/>
-          <p:nvPr/>
-        </p:nvSpPr>
-        <p:spPr>
-          <a:xfrm>
-            <a:off x="201032" y="8152129"/>
-            <a:ext cx="4030058" cy="333425"/>
-          </a:xfrm>
-          <a:prstGeom prst="rect">
-            <a:avLst/>
-          </a:prstGeom>
-          <a:ln w="12700">
-            <a:miter lim="400000"/>
-          </a:ln>
-          <a:extLst>
-            <a:ext uri="{C572A759-6A51-4108-AA02-DFA0A04FC94B}">
-              <ma14:wrappingTextBoxFlag xmlns:ma14="http://schemas.microsoft.com/office/mac/drawingml/2011/main" xmlns="" val="1"/>
-            </a:ext>
-          </a:extLst>
-        </p:spPr>
-        <p:txBody>
-          <a:bodyPr wrap="square" lIns="12700" tIns="12700" rIns="12700" bIns="12700" anchor="ctr">
-            <a:spAutoFit/>
-          </a:bodyPr>
-          <a:lstStyle/>
-          <a:p>
-            <a:pPr lvl="1" indent="0">
-              <a:lnSpc>
-                <a:spcPct val="80000"/>
-              </a:lnSpc>
-              <a:spcBef>
-                <a:spcPts val="0"/>
-              </a:spcBef>
-              <a:defRPr sz="2500" b="0">
-                <a:solidFill>
-                  <a:srgbClr val="628DB5"/>
-                </a:solidFill>
-              </a:defRPr>
-            </a:pPr>
-            <a:r>
-              <a:rPr lang="en-SG" dirty="0"/>
-              <a:t>Transition Name Annotation</a:t>
-            </a:r>
-            <a:endParaRPr dirty="0"/>
-          </a:p>
-        </p:txBody>
-      </p:sp>
-      <p:sp>
-        <p:nvSpPr>
           <p:cNvPr id="87" name="CODE">
             <a:extLst>
               <a:ext uri="{FF2B5EF4-FFF2-40B4-BE49-F238E27FC236}">
@@ -5208,7 +5511,7 @@
         </p:nvSpPr>
         <p:spPr>
           <a:xfrm>
-            <a:off x="201824" y="8505492"/>
+            <a:off x="5028385" y="1495278"/>
             <a:ext cx="1617430" cy="210314"/>
           </a:xfrm>
           <a:prstGeom prst="rect">
@@ -5219,7 +5522,7 @@
           </a:ln>
           <a:extLst>
             <a:ext uri="{C572A759-6A51-4108-AA02-DFA0A04FC94B}">
-              <ma14:wrappingTextBoxFlag xmlns:ma14="http://schemas.microsoft.com/office/mac/drawingml/2011/main" xmlns="" val="1"/>
+              <ma14:wrappingTextBoxFlag xmlns="" xmlns:ma14="http://schemas.microsoft.com/office/mac/drawingml/2011/main" val="1"/>
             </a:ext>
           </a:extLst>
         </p:spPr>
@@ -5252,7 +5555,7 @@
         </p:nvSpPr>
         <p:spPr>
           <a:xfrm>
-            <a:off x="192666" y="8760100"/>
+            <a:off x="5085902" y="1759411"/>
             <a:ext cx="2007353" cy="442605"/>
           </a:xfrm>
           <a:prstGeom prst="rect">
@@ -5263,7 +5566,7 @@
           </a:ln>
           <a:extLst>
             <a:ext uri="{C572A759-6A51-4108-AA02-DFA0A04FC94B}">
-              <ma14:wrappingTextBoxFlag xmlns:ma14="http://schemas.microsoft.com/office/mac/drawingml/2011/main" xmlns="" val="1"/>
+              <ma14:wrappingTextBoxFlag xmlns="" xmlns:ma14="http://schemas.microsoft.com/office/mac/drawingml/2011/main" val="1"/>
             </a:ext>
           </a:extLst>
         </p:spPr>
@@ -5340,7 +5643,7 @@
           </a:ln>
           <a:extLst>
             <a:ext uri="{C572A759-6A51-4108-AA02-DFA0A04FC94B}">
-              <ma14:wrappingTextBoxFlag xmlns:ma14="http://schemas.microsoft.com/office/mac/drawingml/2011/main" xmlns="" val="1"/>
+              <ma14:wrappingTextBoxFlag xmlns="" xmlns:ma14="http://schemas.microsoft.com/office/mac/drawingml/2011/main" val="1"/>
             </a:ext>
           </a:extLst>
         </p:spPr>
@@ -5396,7 +5699,7 @@
           </a:ln>
           <a:extLst>
             <a:ext uri="{C572A759-6A51-4108-AA02-DFA0A04FC94B}">
-              <ma14:wrappingTextBoxFlag xmlns:ma14="http://schemas.microsoft.com/office/mac/drawingml/2011/main" xmlns="" val="1"/>
+              <ma14:wrappingTextBoxFlag xmlns="" xmlns:ma14="http://schemas.microsoft.com/office/mac/drawingml/2011/main" val="1"/>
             </a:ext>
           </a:extLst>
         </p:spPr>
@@ -5440,7 +5743,7 @@
           </a:ln>
           <a:extLst>
             <a:ext uri="{C572A759-6A51-4108-AA02-DFA0A04FC94B}">
-              <ma14:wrappingTextBoxFlag xmlns:ma14="http://schemas.microsoft.com/office/mac/drawingml/2011/main" xmlns="" val="1"/>
+              <ma14:wrappingTextBoxFlag xmlns="" xmlns:ma14="http://schemas.microsoft.com/office/mac/drawingml/2011/main" val="1"/>
             </a:ext>
           </a:extLst>
         </p:spPr>
@@ -5575,7 +5878,7 @@
         </p:nvSpPr>
         <p:spPr>
           <a:xfrm>
-            <a:off x="4996683" y="5395567"/>
+            <a:off x="4996683" y="5809912"/>
             <a:ext cx="4030058" cy="333425"/>
           </a:xfrm>
           <a:prstGeom prst="rect">
@@ -5586,7 +5889,7 @@
           </a:ln>
           <a:extLst>
             <a:ext uri="{C572A759-6A51-4108-AA02-DFA0A04FC94B}">
-              <ma14:wrappingTextBoxFlag xmlns:ma14="http://schemas.microsoft.com/office/mac/drawingml/2011/main" xmlns="" val="1"/>
+              <ma14:wrappingTextBoxFlag xmlns="" xmlns:ma14="http://schemas.microsoft.com/office/mac/drawingml/2011/main" val="1"/>
             </a:ext>
           </a:extLst>
         </p:spPr>
@@ -5631,8 +5934,8 @@
         </p:nvSpPr>
         <p:spPr>
           <a:xfrm>
-            <a:off x="4938255" y="5317335"/>
-            <a:ext cx="8943437" cy="3399"/>
+            <a:off x="4938255" y="5731680"/>
+            <a:ext cx="8994977" cy="48592"/>
           </a:xfrm>
           <a:prstGeom prst="line">
             <a:avLst/>
@@ -5679,7 +5982,7 @@
         </p:nvSpPr>
         <p:spPr>
           <a:xfrm>
-            <a:off x="5029206" y="5779349"/>
+            <a:off x="5029206" y="6193694"/>
             <a:ext cx="2420534" cy="210314"/>
           </a:xfrm>
           <a:prstGeom prst="rect">
@@ -5690,7 +5993,7 @@
           </a:ln>
           <a:extLst>
             <a:ext uri="{C572A759-6A51-4108-AA02-DFA0A04FC94B}">
-              <ma14:wrappingTextBoxFlag xmlns:ma14="http://schemas.microsoft.com/office/mac/drawingml/2011/main" xmlns="" val="1"/>
+              <ma14:wrappingTextBoxFlag xmlns="" xmlns:ma14="http://schemas.microsoft.com/office/mac/drawingml/2011/main" val="1"/>
             </a:ext>
           </a:extLst>
         </p:spPr>
@@ -5723,7 +6026,7 @@
         </p:nvSpPr>
         <p:spPr>
           <a:xfrm>
-            <a:off x="5041078" y="8048458"/>
+            <a:off x="5041078" y="8462803"/>
             <a:ext cx="2165721" cy="276405"/>
           </a:xfrm>
           <a:prstGeom prst="rect">
@@ -5734,7 +6037,7 @@
           </a:ln>
           <a:extLst>
             <a:ext uri="{C572A759-6A51-4108-AA02-DFA0A04FC94B}">
-              <ma14:wrappingTextBoxFlag xmlns:ma14="http://schemas.microsoft.com/office/mac/drawingml/2011/main" xmlns="" val="1"/>
+              <ma14:wrappingTextBoxFlag xmlns="" xmlns:ma14="http://schemas.microsoft.com/office/mac/drawingml/2011/main" val="1"/>
             </a:ext>
           </a:extLst>
         </p:spPr>
@@ -5789,7 +6092,7 @@
         </p:nvSpPr>
         <p:spPr>
           <a:xfrm>
-            <a:off x="5127149" y="9124238"/>
+            <a:off x="5127149" y="9538583"/>
             <a:ext cx="2382309" cy="608804"/>
           </a:xfrm>
           <a:prstGeom prst="rect">
@@ -5800,7 +6103,7 @@
           </a:ln>
           <a:extLst>
             <a:ext uri="{C572A759-6A51-4108-AA02-DFA0A04FC94B}">
-              <ma14:wrappingTextBoxFlag xmlns:ma14="http://schemas.microsoft.com/office/mac/drawingml/2011/main" xmlns="" val="1"/>
+              <ma14:wrappingTextBoxFlag xmlns="" xmlns:ma14="http://schemas.microsoft.com/office/mac/drawingml/2011/main" val="1"/>
             </a:ext>
           </a:extLst>
         </p:spPr>
@@ -5883,7 +6186,7 @@
         </p:nvSpPr>
         <p:spPr>
           <a:xfrm>
-            <a:off x="4962068" y="6089224"/>
+            <a:off x="4962068" y="6503569"/>
             <a:ext cx="2609646" cy="442605"/>
           </a:xfrm>
           <a:prstGeom prst="rect">
@@ -5894,7 +6197,7 @@
           </a:ln>
           <a:extLst>
             <a:ext uri="{C572A759-6A51-4108-AA02-DFA0A04FC94B}">
-              <ma14:wrappingTextBoxFlag xmlns:ma14="http://schemas.microsoft.com/office/mac/drawingml/2011/main" xmlns="" val="1"/>
+              <ma14:wrappingTextBoxFlag xmlns="" xmlns:ma14="http://schemas.microsoft.com/office/mac/drawingml/2011/main" val="1"/>
             </a:ext>
           </a:extLst>
         </p:spPr>
@@ -5956,14 +6259,14 @@
           <p:nvPr/>
         </p:nvPicPr>
         <p:blipFill>
-          <a:blip r:embed="rId6"/>
+          <a:blip r:embed="rId4"/>
           <a:stretch>
             <a:fillRect/>
           </a:stretch>
         </p:blipFill>
         <p:spPr>
           <a:xfrm>
-            <a:off x="11590717" y="6515796"/>
+            <a:off x="11590717" y="6930141"/>
             <a:ext cx="1545455" cy="319102"/>
           </a:xfrm>
           <a:prstGeom prst="rect">
@@ -5985,7 +6288,7 @@
         </p:nvSpPr>
         <p:spPr>
           <a:xfrm>
-            <a:off x="7576077" y="6085632"/>
+            <a:off x="7576077" y="6499977"/>
             <a:ext cx="2894391" cy="442605"/>
           </a:xfrm>
           <a:prstGeom prst="rect">
@@ -5996,7 +6299,7 @@
           </a:ln>
           <a:extLst>
             <a:ext uri="{C572A759-6A51-4108-AA02-DFA0A04FC94B}">
-              <ma14:wrappingTextBoxFlag xmlns:ma14="http://schemas.microsoft.com/office/mac/drawingml/2011/main" xmlns="" val="1"/>
+              <ma14:wrappingTextBoxFlag xmlns="" xmlns:ma14="http://schemas.microsoft.com/office/mac/drawingml/2011/main" val="1"/>
             </a:ext>
           </a:extLst>
         </p:spPr>
@@ -6051,7 +6354,7 @@
         </p:nvSpPr>
         <p:spPr>
           <a:xfrm>
-            <a:off x="10784976" y="6085632"/>
+            <a:off x="10784976" y="6499977"/>
             <a:ext cx="2894391" cy="442605"/>
           </a:xfrm>
           <a:prstGeom prst="rect">
@@ -6062,7 +6365,7 @@
           </a:ln>
           <a:extLst>
             <a:ext uri="{C572A759-6A51-4108-AA02-DFA0A04FC94B}">
-              <ma14:wrappingTextBoxFlag xmlns:ma14="http://schemas.microsoft.com/office/mac/drawingml/2011/main" xmlns="" val="1"/>
+              <ma14:wrappingTextBoxFlag xmlns="" xmlns:ma14="http://schemas.microsoft.com/office/mac/drawingml/2011/main" val="1"/>
             </a:ext>
           </a:extLst>
         </p:spPr>
@@ -6117,7 +6420,7 @@
         </p:nvSpPr>
         <p:spPr>
           <a:xfrm>
-            <a:off x="10916248" y="6842549"/>
+            <a:off x="10916248" y="7256894"/>
             <a:ext cx="2894391" cy="442605"/>
           </a:xfrm>
           <a:prstGeom prst="rect">
@@ -6128,7 +6431,7 @@
           </a:ln>
           <a:extLst>
             <a:ext uri="{C572A759-6A51-4108-AA02-DFA0A04FC94B}">
-              <ma14:wrappingTextBoxFlag xmlns:ma14="http://schemas.microsoft.com/office/mac/drawingml/2011/main" xmlns="" val="1"/>
+              <ma14:wrappingTextBoxFlag xmlns="" xmlns:ma14="http://schemas.microsoft.com/office/mac/drawingml/2011/main" val="1"/>
             </a:ext>
           </a:extLst>
         </p:spPr>
@@ -6181,8 +6484,8 @@
         </p:nvSpPr>
         <p:spPr>
           <a:xfrm>
-            <a:off x="9659761" y="1060800"/>
-            <a:ext cx="16281" cy="4262307"/>
+            <a:off x="9627455" y="1047667"/>
+            <a:ext cx="24754" cy="4684013"/>
           </a:xfrm>
           <a:prstGeom prst="line">
             <a:avLst/>
@@ -6228,9 +6531,9 @@
           <p:nvPr/>
         </p:nvSpPr>
         <p:spPr>
-          <a:xfrm>
-            <a:off x="4917524" y="1020997"/>
-            <a:ext cx="6281" cy="9593967"/>
+          <a:xfrm flipH="1">
+            <a:off x="4929661" y="1077788"/>
+            <a:ext cx="1" cy="9704756"/>
           </a:xfrm>
           <a:prstGeom prst="line">
             <a:avLst/>
@@ -6265,74 +6568,6 @@
       </p:sp>
       <p:sp>
         <p:nvSpPr>
-          <p:cNvPr id="74" name="RStudio® is a trademark of RStudio, Inc.  •  CC BY SA Your Name •  your@email.com  •  844-448-1212 • your.website.com •  Learn more at webpage or vignette   •  package version  0.5.0 •  Updated: 2017-01">
-            <a:extLst>
-              <a:ext uri="{FF2B5EF4-FFF2-40B4-BE49-F238E27FC236}">
-                <a16:creationId xmlns:a16="http://schemas.microsoft.com/office/drawing/2014/main" id="{C15179CE-25E4-4B1E-B173-BDD05D9EB977}"/>
-              </a:ext>
-            </a:extLst>
-          </p:cNvPr>
-          <p:cNvSpPr txBox="1"/>
-          <p:nvPr/>
-        </p:nvSpPr>
-        <p:spPr>
-          <a:xfrm>
-            <a:off x="12440394" y="10441191"/>
-            <a:ext cx="1379964" cy="234855"/>
-          </a:xfrm>
-          <a:prstGeom prst="rect">
-            <a:avLst/>
-          </a:prstGeom>
-          <a:ln w="12700">
-            <a:miter lim="400000"/>
-          </a:ln>
-          <a:extLst>
-            <a:ext uri="{C572A759-6A51-4108-AA02-DFA0A04FC94B}">
-              <ma14:wrappingTextBoxFlag xmlns:ma14="http://schemas.microsoft.com/office/mac/drawingml/2011/main" xmlns="" val="1"/>
-            </a:ext>
-          </a:extLst>
-        </p:spPr>
-        <p:txBody>
-          <a:bodyPr wrap="square" lIns="54570" tIns="54570" rIns="54570" bIns="54570" anchor="ctr">
-            <a:spAutoFit/>
-          </a:bodyPr>
-          <a:lstStyle/>
-          <a:p>
-            <a:pPr algn="r">
-              <a:lnSpc>
-                <a:spcPct val="90000"/>
-              </a:lnSpc>
-              <a:spcBef>
-                <a:spcPts val="0"/>
-              </a:spcBef>
-              <a:defRPr sz="900" b="0">
-                <a:solidFill>
-                  <a:srgbClr val="000000"/>
-                </a:solidFill>
-              </a:defRPr>
-            </a:pPr>
-            <a:r>
-              <a:rPr dirty="0"/>
-              <a:t>Updated: 20</a:t>
-            </a:r>
-            <a:r>
-              <a:rPr lang="en-SG" dirty="0"/>
-              <a:t>21</a:t>
-            </a:r>
-            <a:r>
-              <a:rPr dirty="0"/>
-              <a:t>-0</a:t>
-            </a:r>
-            <a:r>
-              <a:rPr lang="en-SG" dirty="0"/>
-              <a:t>9</a:t>
-            </a:r>
-            <a:endParaRPr dirty="0"/>
-          </a:p>
-        </p:txBody>
-      </p:sp>
-      <p:sp>
-        <p:nvSpPr>
           <p:cNvPr id="76" name="Where possible, use code that works when run.">
             <a:extLst>
               <a:ext uri="{FF2B5EF4-FFF2-40B4-BE49-F238E27FC236}">
@@ -6345,7 +6580,7 @@
         </p:nvSpPr>
         <p:spPr>
           <a:xfrm>
-            <a:off x="7832222" y="6965480"/>
+            <a:off x="7832222" y="7379825"/>
             <a:ext cx="2727623" cy="442605"/>
           </a:xfrm>
           <a:prstGeom prst="rect">
@@ -6356,7 +6591,7 @@
           </a:ln>
           <a:extLst>
             <a:ext uri="{C572A759-6A51-4108-AA02-DFA0A04FC94B}">
-              <ma14:wrappingTextBoxFlag xmlns:ma14="http://schemas.microsoft.com/office/mac/drawingml/2011/main" xmlns="" val="1"/>
+              <ma14:wrappingTextBoxFlag xmlns="" xmlns:ma14="http://schemas.microsoft.com/office/mac/drawingml/2011/main" val="1"/>
             </a:ext>
           </a:extLst>
         </p:spPr>
@@ -6435,14 +6670,14 @@
           <p:nvPr/>
         </p:nvPicPr>
         <p:blipFill>
-          <a:blip r:embed="rId7"/>
+          <a:blip r:embed="rId5"/>
           <a:stretch>
             <a:fillRect/>
           </a:stretch>
         </p:blipFill>
         <p:spPr>
           <a:xfrm>
-            <a:off x="8421734" y="7394957"/>
+            <a:off x="8421734" y="7809302"/>
             <a:ext cx="1261880" cy="230344"/>
           </a:xfrm>
           <a:prstGeom prst="rect">
@@ -6463,14 +6698,14 @@
           <p:nvPr/>
         </p:nvPicPr>
         <p:blipFill>
-          <a:blip r:embed="rId8"/>
+          <a:blip r:embed="rId6"/>
           <a:stretch>
             <a:fillRect/>
           </a:stretch>
         </p:blipFill>
         <p:spPr>
           <a:xfrm>
-            <a:off x="7977778" y="8097304"/>
+            <a:off x="7977778" y="8511649"/>
             <a:ext cx="2213847" cy="1266616"/>
           </a:xfrm>
           <a:prstGeom prst="rect">
@@ -6493,14 +6728,14 @@
           <p:nvPr/>
         </p:nvPicPr>
         <p:blipFill>
-          <a:blip r:embed="rId9"/>
+          <a:blip r:embed="rId7"/>
           <a:stretch>
             <a:fillRect/>
           </a:stretch>
         </p:blipFill>
         <p:spPr>
           <a:xfrm>
-            <a:off x="7712802" y="9492312"/>
+            <a:off x="7712802" y="9906657"/>
             <a:ext cx="2844095" cy="747289"/>
           </a:xfrm>
           <a:prstGeom prst="rect">
@@ -6522,7 +6757,7 @@
         </p:nvSpPr>
         <p:spPr>
           <a:xfrm>
-            <a:off x="7832221" y="7662518"/>
+            <a:off x="7832221" y="8076863"/>
             <a:ext cx="2727623" cy="442605"/>
           </a:xfrm>
           <a:prstGeom prst="rect">
@@ -6533,7 +6768,7 @@
           </a:ln>
           <a:extLst>
             <a:ext uri="{C572A759-6A51-4108-AA02-DFA0A04FC94B}">
-              <ma14:wrappingTextBoxFlag xmlns:ma14="http://schemas.microsoft.com/office/mac/drawingml/2011/main" xmlns="" val="1"/>
+              <ma14:wrappingTextBoxFlag xmlns="" xmlns:ma14="http://schemas.microsoft.com/office/mac/drawingml/2011/main" val="1"/>
             </a:ext>
           </a:extLst>
         </p:spPr>
@@ -6593,7 +6828,7 @@
           <p:nvPr/>
         </p:nvPicPr>
         <p:blipFill>
-          <a:blip r:embed="rId10"/>
+          <a:blip r:embed="rId8"/>
           <a:stretch>
             <a:fillRect/>
           </a:stretch>
@@ -6623,7 +6858,7 @@
           <p:nvPr/>
         </p:nvPicPr>
         <p:blipFill>
-          <a:blip r:embed="rId11"/>
+          <a:blip r:embed="rId9"/>
           <a:stretch>
             <a:fillRect/>
           </a:stretch>
@@ -6653,14 +6888,14 @@
           <p:nvPr/>
         </p:nvPicPr>
         <p:blipFill>
-          <a:blip r:embed="rId12"/>
+          <a:blip r:embed="rId10"/>
           <a:stretch>
             <a:fillRect/>
           </a:stretch>
         </p:blipFill>
         <p:spPr>
           <a:xfrm>
-            <a:off x="11054138" y="7330468"/>
+            <a:off x="11054138" y="7744813"/>
             <a:ext cx="1225886" cy="327777"/>
           </a:xfrm>
           <a:prstGeom prst="rect">
@@ -6683,14 +6918,14 @@
           <p:nvPr/>
         </p:nvPicPr>
         <p:blipFill>
-          <a:blip r:embed="rId13"/>
+          <a:blip r:embed="rId11"/>
           <a:stretch>
             <a:fillRect/>
           </a:stretch>
         </p:blipFill>
         <p:spPr>
           <a:xfrm>
-            <a:off x="11027575" y="7821602"/>
+            <a:off x="11027575" y="8235947"/>
             <a:ext cx="1252449" cy="450319"/>
           </a:xfrm>
           <a:prstGeom prst="rect">
@@ -6713,14 +6948,14 @@
           <p:nvPr/>
         </p:nvPicPr>
         <p:blipFill>
-          <a:blip r:embed="rId14"/>
+          <a:blip r:embed="rId12"/>
           <a:stretch>
             <a:fillRect/>
           </a:stretch>
         </p:blipFill>
         <p:spPr>
           <a:xfrm>
-            <a:off x="12421072" y="7548134"/>
+            <a:off x="12421072" y="7962479"/>
             <a:ext cx="1275765" cy="490679"/>
           </a:xfrm>
           <a:prstGeom prst="rect">
@@ -6743,15 +6978,15 @@
           <p:nvPr/>
         </p:nvPicPr>
         <p:blipFill>
-          <a:blip r:embed="rId15"/>
+          <a:blip r:embed="rId13"/>
           <a:stretch>
             <a:fillRect/>
           </a:stretch>
         </p:blipFill>
         <p:spPr>
           <a:xfrm>
-            <a:off x="229607" y="9248752"/>
-            <a:ext cx="2112563" cy="240084"/>
+            <a:off x="5113318" y="2238538"/>
+            <a:ext cx="2018037" cy="229342"/>
           </a:xfrm>
           <a:prstGeom prst="rect">
             <a:avLst/>
@@ -6773,15 +7008,15 @@
           <p:nvPr/>
         </p:nvPicPr>
         <p:blipFill>
-          <a:blip r:embed="rId16"/>
+          <a:blip r:embed="rId14"/>
           <a:stretch>
             <a:fillRect/>
           </a:stretch>
         </p:blipFill>
         <p:spPr>
           <a:xfrm>
-            <a:off x="210143" y="9559113"/>
-            <a:ext cx="2152634" cy="233715"/>
+            <a:off x="5093854" y="2548900"/>
+            <a:ext cx="2064171" cy="224110"/>
           </a:xfrm>
           <a:prstGeom prst="rect">
             <a:avLst/>
@@ -6803,15 +7038,15 @@
           <p:nvPr/>
         </p:nvPicPr>
         <p:blipFill>
-          <a:blip r:embed="rId17"/>
+          <a:blip r:embed="rId15"/>
           <a:stretch>
             <a:fillRect/>
           </a:stretch>
         </p:blipFill>
         <p:spPr>
           <a:xfrm>
-            <a:off x="5648571" y="2373548"/>
-            <a:ext cx="950733" cy="285220"/>
+            <a:off x="5696254" y="3610914"/>
+            <a:ext cx="787080" cy="236124"/>
           </a:xfrm>
           <a:prstGeom prst="rect">
             <a:avLst/>
@@ -6833,14 +7068,14 @@
           <p:nvPr/>
         </p:nvPicPr>
         <p:blipFill>
-          <a:blip r:embed="rId18"/>
+          <a:blip r:embed="rId16"/>
           <a:stretch>
             <a:fillRect/>
           </a:stretch>
         </p:blipFill>
         <p:spPr>
           <a:xfrm>
-            <a:off x="7647735" y="2380761"/>
+            <a:off x="7647735" y="3815237"/>
             <a:ext cx="1447600" cy="263200"/>
           </a:xfrm>
           <a:prstGeom prst="rect">
@@ -6863,15 +7098,15 @@
           <p:nvPr/>
         </p:nvPicPr>
         <p:blipFill>
-          <a:blip r:embed="rId19"/>
+          <a:blip r:embed="rId17"/>
           <a:stretch>
             <a:fillRect/>
           </a:stretch>
         </p:blipFill>
         <p:spPr>
           <a:xfrm>
-            <a:off x="2518064" y="8644219"/>
-            <a:ext cx="2272326" cy="1088823"/>
+            <a:off x="7383503" y="1609096"/>
+            <a:ext cx="2070859" cy="992286"/>
           </a:xfrm>
           <a:prstGeom prst="rect">
             <a:avLst/>
@@ -6893,7 +7128,7 @@
           <p:nvPr/>
         </p:nvPicPr>
         <p:blipFill rotWithShape="1">
-          <a:blip r:embed="rId20" cstate="print">
+          <a:blip r:embed="rId18" cstate="print">
             <a:extLst>
               <a:ext uri="{28A0092B-C50C-407E-A947-70E740481C1C}">
                 <a14:useLocalDpi xmlns:a14="http://schemas.microsoft.com/office/drawing/2010/main"/>
@@ -6905,8 +7140,8 @@
         </p:blipFill>
         <p:spPr>
           <a:xfrm>
-            <a:off x="5127149" y="2832812"/>
-            <a:ext cx="1975195" cy="1847972"/>
+            <a:off x="5279644" y="3942186"/>
+            <a:ext cx="1752696" cy="1639804"/>
           </a:xfrm>
           <a:prstGeom prst="rect">
             <a:avLst/>
@@ -6928,14 +7163,14 @@
           <p:nvPr/>
         </p:nvPicPr>
         <p:blipFill>
-          <a:blip r:embed="rId21"/>
+          <a:blip r:embed="rId19"/>
           <a:stretch>
             <a:fillRect/>
           </a:stretch>
         </p:blipFill>
         <p:spPr>
           <a:xfrm>
-            <a:off x="7487774" y="2858995"/>
+            <a:off x="7487774" y="4236321"/>
             <a:ext cx="1752695" cy="1299649"/>
           </a:xfrm>
           <a:prstGeom prst="rect">
@@ -6958,7 +7193,7 @@
           <p:nvPr/>
         </p:nvPicPr>
         <p:blipFill>
-          <a:blip r:embed="rId22"/>
+          <a:blip r:embed="rId20"/>
           <a:stretch>
             <a:fillRect/>
           </a:stretch>
@@ -6988,7 +7223,7 @@
           <p:nvPr/>
         </p:nvPicPr>
         <p:blipFill>
-          <a:blip r:embed="rId23"/>
+          <a:blip r:embed="rId21"/>
           <a:stretch>
             <a:fillRect/>
           </a:stretch>
@@ -7018,13 +7253,13 @@
           <p:nvPr/>
         </p:nvPicPr>
         <p:blipFill rotWithShape="1">
-          <a:blip r:embed="rId24"/>
+          <a:blip r:embed="rId22"/>
           <a:srcRect l="359" t="2162" r="1"/>
           <a:stretch/>
         </p:blipFill>
         <p:spPr>
           <a:xfrm>
-            <a:off x="5101906" y="7273193"/>
+            <a:off x="5101906" y="7687538"/>
             <a:ext cx="2400157" cy="639950"/>
           </a:xfrm>
           <a:prstGeom prst="rect">
@@ -7047,14 +7282,14 @@
           <p:nvPr/>
         </p:nvPicPr>
         <p:blipFill>
-          <a:blip r:embed="rId25"/>
+          <a:blip r:embed="rId23"/>
           <a:stretch>
             <a:fillRect/>
           </a:stretch>
         </p:blipFill>
         <p:spPr>
           <a:xfrm>
-            <a:off x="5218055" y="6520417"/>
+            <a:off x="5218055" y="6934762"/>
             <a:ext cx="2001110" cy="226212"/>
           </a:xfrm>
           <a:prstGeom prst="rect">
@@ -7077,14 +7312,14 @@
           <p:nvPr/>
         </p:nvPicPr>
         <p:blipFill>
-          <a:blip r:embed="rId26"/>
+          <a:blip r:embed="rId24"/>
           <a:stretch>
             <a:fillRect/>
           </a:stretch>
         </p:blipFill>
         <p:spPr>
           <a:xfrm>
-            <a:off x="5242851" y="6818245"/>
+            <a:off x="5242851" y="7232590"/>
             <a:ext cx="1973473" cy="256666"/>
           </a:xfrm>
           <a:prstGeom prst="rect">
@@ -7107,14 +7342,14 @@
           <p:nvPr/>
         </p:nvPicPr>
         <p:blipFill>
-          <a:blip r:embed="rId27"/>
+          <a:blip r:embed="rId25"/>
           <a:stretch>
             <a:fillRect/>
           </a:stretch>
         </p:blipFill>
         <p:spPr>
           <a:xfrm>
-            <a:off x="5444504" y="8339138"/>
+            <a:off x="5444504" y="8753483"/>
             <a:ext cx="1658598" cy="671630"/>
           </a:xfrm>
           <a:prstGeom prst="rect">
@@ -7137,14 +7372,14 @@
           <p:nvPr/>
         </p:nvPicPr>
         <p:blipFill>
-          <a:blip r:embed="rId28"/>
+          <a:blip r:embed="rId26"/>
           <a:stretch>
             <a:fillRect/>
           </a:stretch>
         </p:blipFill>
         <p:spPr>
           <a:xfrm>
-            <a:off x="5337534" y="9810143"/>
+            <a:off x="5337534" y="10224488"/>
             <a:ext cx="1784106" cy="241096"/>
           </a:xfrm>
           <a:prstGeom prst="rect">
@@ -7167,14 +7402,14 @@
           <p:nvPr/>
         </p:nvPicPr>
         <p:blipFill>
-          <a:blip r:embed="rId29"/>
+          <a:blip r:embed="rId27"/>
           <a:stretch>
             <a:fillRect/>
           </a:stretch>
         </p:blipFill>
         <p:spPr>
           <a:xfrm>
-            <a:off x="7882272" y="6554143"/>
+            <a:off x="7882272" y="6968488"/>
             <a:ext cx="2672487" cy="319103"/>
           </a:xfrm>
           <a:prstGeom prst="rect">
@@ -7182,6 +7417,468 @@
           </a:prstGeom>
         </p:spPr>
       </p:pic>
+      <p:sp>
+        <p:nvSpPr>
+          <p:cNvPr id="72" name="RStudio® is a trademark of RStudio, Inc.  •  CC BY SA Your Name •  your@email.com  •  844-448-1212 • your.website.com •  Learn more at webpage or vignette   •  package version  0.5.0 •  Updated: 2017-01">
+            <a:extLst>
+              <a:ext uri="{FF2B5EF4-FFF2-40B4-BE49-F238E27FC236}">
+                <a16:creationId xmlns:a16="http://schemas.microsoft.com/office/drawing/2014/main" id="{8AF37261-35CD-4173-8955-318FAC944085}"/>
+              </a:ext>
+            </a:extLst>
+          </p:cNvPr>
+          <p:cNvSpPr txBox="1"/>
+          <p:nvPr/>
+        </p:nvSpPr>
+        <p:spPr>
+          <a:xfrm>
+            <a:off x="12440394" y="10441191"/>
+            <a:ext cx="1379964" cy="234855"/>
+          </a:xfrm>
+          <a:prstGeom prst="rect">
+            <a:avLst/>
+          </a:prstGeom>
+          <a:ln w="12700">
+            <a:miter lim="400000"/>
+          </a:ln>
+          <a:extLst>
+            <a:ext uri="{C572A759-6A51-4108-AA02-DFA0A04FC94B}">
+              <ma14:wrappingTextBoxFlag xmlns="" xmlns:ma14="http://schemas.microsoft.com/office/mac/drawingml/2011/main" val="1"/>
+            </a:ext>
+          </a:extLst>
+        </p:spPr>
+        <p:txBody>
+          <a:bodyPr wrap="square" lIns="54570" tIns="54570" rIns="54570" bIns="54570" anchor="ctr">
+            <a:spAutoFit/>
+          </a:bodyPr>
+          <a:lstStyle/>
+          <a:p>
+            <a:pPr algn="r">
+              <a:lnSpc>
+                <a:spcPct val="90000"/>
+              </a:lnSpc>
+              <a:spcBef>
+                <a:spcPts val="0"/>
+              </a:spcBef>
+              <a:defRPr sz="900" b="0">
+                <a:solidFill>
+                  <a:srgbClr val="000000"/>
+                </a:solidFill>
+              </a:defRPr>
+            </a:pPr>
+            <a:r>
+              <a:rPr dirty="0"/>
+              <a:t>Updated: 20</a:t>
+            </a:r>
+            <a:r>
+              <a:rPr lang="en-SG" dirty="0"/>
+              <a:t>21</a:t>
+            </a:r>
+            <a:r>
+              <a:rPr dirty="0"/>
+              <a:t>-</a:t>
+            </a:r>
+            <a:r>
+              <a:rPr lang="en-SG" dirty="0"/>
+              <a:t>10</a:t>
+            </a:r>
+            <a:endParaRPr dirty="0"/>
+          </a:p>
+        </p:txBody>
+      </p:sp>
+      <p:pic>
+        <p:nvPicPr>
+          <p:cNvPr id="3" name="Picture 2">
+            <a:extLst>
+              <a:ext uri="{FF2B5EF4-FFF2-40B4-BE49-F238E27FC236}">
+                <a16:creationId xmlns:a16="http://schemas.microsoft.com/office/drawing/2014/main" id="{69E9605A-C61D-4E79-8630-D1CC687A76D9}"/>
+              </a:ext>
+            </a:extLst>
+          </p:cNvPr>
+          <p:cNvPicPr>
+            <a:picLocks noChangeAspect="1"/>
+          </p:cNvPicPr>
+          <p:nvPr/>
+        </p:nvPicPr>
+        <p:blipFill>
+          <a:blip r:embed="rId28"/>
+          <a:stretch>
+            <a:fillRect/>
+          </a:stretch>
+        </p:blipFill>
+        <p:spPr>
+          <a:xfrm>
+            <a:off x="154757" y="7376295"/>
+            <a:ext cx="4671780" cy="566483"/>
+          </a:xfrm>
+          <a:prstGeom prst="rect">
+            <a:avLst/>
+          </a:prstGeom>
+        </p:spPr>
+      </p:pic>
+      <p:pic>
+        <p:nvPicPr>
+          <p:cNvPr id="23" name="Picture 22">
+            <a:extLst>
+              <a:ext uri="{FF2B5EF4-FFF2-40B4-BE49-F238E27FC236}">
+                <a16:creationId xmlns:a16="http://schemas.microsoft.com/office/drawing/2014/main" id="{B2149A40-7DAC-4CB3-8538-AA64FB187012}"/>
+              </a:ext>
+            </a:extLst>
+          </p:cNvPr>
+          <p:cNvPicPr>
+            <a:picLocks noChangeAspect="1"/>
+          </p:cNvPicPr>
+          <p:nvPr/>
+        </p:nvPicPr>
+        <p:blipFill rotWithShape="1">
+          <a:blip r:embed="rId29"/>
+          <a:srcRect b="37713"/>
+          <a:stretch/>
+        </p:blipFill>
+        <p:spPr>
+          <a:xfrm>
+            <a:off x="152781" y="6456827"/>
+            <a:ext cx="4666548" cy="581853"/>
+          </a:xfrm>
+          <a:prstGeom prst="rect">
+            <a:avLst/>
+          </a:prstGeom>
+        </p:spPr>
+      </p:pic>
+      <p:pic>
+        <p:nvPicPr>
+          <p:cNvPr id="24" name="Picture 23">
+            <a:extLst>
+              <a:ext uri="{FF2B5EF4-FFF2-40B4-BE49-F238E27FC236}">
+                <a16:creationId xmlns:a16="http://schemas.microsoft.com/office/drawing/2014/main" id="{43C089B0-0996-4CCF-AA00-6B1748A3447C}"/>
+              </a:ext>
+            </a:extLst>
+          </p:cNvPr>
+          <p:cNvPicPr>
+            <a:picLocks noChangeAspect="1"/>
+          </p:cNvPicPr>
+          <p:nvPr/>
+        </p:nvPicPr>
+        <p:blipFill rotWithShape="1">
+          <a:blip r:embed="rId30"/>
+          <a:srcRect r="12962"/>
+          <a:stretch/>
+        </p:blipFill>
+        <p:spPr>
+          <a:xfrm>
+            <a:off x="171036" y="5495331"/>
+            <a:ext cx="4642657" cy="635915"/>
+          </a:xfrm>
+          <a:prstGeom prst="rect">
+            <a:avLst/>
+          </a:prstGeom>
+        </p:spPr>
+      </p:pic>
+      <p:pic>
+        <p:nvPicPr>
+          <p:cNvPr id="26" name="Picture 25">
+            <a:extLst>
+              <a:ext uri="{FF2B5EF4-FFF2-40B4-BE49-F238E27FC236}">
+                <a16:creationId xmlns:a16="http://schemas.microsoft.com/office/drawing/2014/main" id="{F99F8727-9362-42FC-9924-3B25A1A45697}"/>
+              </a:ext>
+            </a:extLst>
+          </p:cNvPr>
+          <p:cNvPicPr>
+            <a:picLocks noChangeAspect="1"/>
+          </p:cNvPicPr>
+          <p:nvPr/>
+        </p:nvPicPr>
+        <p:blipFill>
+          <a:blip r:embed="rId31"/>
+          <a:stretch>
+            <a:fillRect/>
+          </a:stretch>
+        </p:blipFill>
+        <p:spPr>
+          <a:xfrm>
+            <a:off x="181568" y="4590357"/>
+            <a:ext cx="4615687" cy="593704"/>
+          </a:xfrm>
+          <a:prstGeom prst="rect">
+            <a:avLst/>
+          </a:prstGeom>
+        </p:spPr>
+      </p:pic>
+      <p:sp>
+        <p:nvSpPr>
+          <p:cNvPr id="81" name="Where possible, use code that works when run.">
+            <a:extLst>
+              <a:ext uri="{FF2B5EF4-FFF2-40B4-BE49-F238E27FC236}">
+                <a16:creationId xmlns:a16="http://schemas.microsoft.com/office/drawing/2014/main" id="{D9B7748A-A0A0-403C-8144-C4705028FB62}"/>
+              </a:ext>
+            </a:extLst>
+          </p:cNvPr>
+          <p:cNvSpPr txBox="1"/>
+          <p:nvPr/>
+        </p:nvSpPr>
+        <p:spPr>
+          <a:xfrm>
+            <a:off x="240792" y="4331398"/>
+            <a:ext cx="2007353" cy="262555"/>
+          </a:xfrm>
+          <a:prstGeom prst="rect">
+            <a:avLst/>
+          </a:prstGeom>
+          <a:ln w="12700">
+            <a:miter lim="400000"/>
+          </a:ln>
+          <a:extLst>
+            <a:ext uri="{C572A759-6A51-4108-AA02-DFA0A04FC94B}">
+              <ma14:wrappingTextBoxFlag xmlns="" xmlns:ma14="http://schemas.microsoft.com/office/mac/drawingml/2011/main" val="1"/>
+            </a:ext>
+          </a:extLst>
+        </p:spPr>
+        <p:txBody>
+          <a:bodyPr wrap="square" lIns="54570" tIns="54570" rIns="54570" bIns="54570" anchor="ctr">
+            <a:spAutoFit/>
+          </a:bodyPr>
+          <a:lstStyle/>
+          <a:p>
+            <a:pPr>
+              <a:lnSpc>
+                <a:spcPct val="90000"/>
+              </a:lnSpc>
+              <a:spcBef>
+                <a:spcPts val="300"/>
+              </a:spcBef>
+              <a:buClr>
+                <a:schemeClr val="accent4">
+                  <a:hueOff val="384618"/>
+                  <a:satOff val="3869"/>
+                  <a:lumOff val="5802"/>
+                </a:schemeClr>
+              </a:buClr>
+              <a:defRPr b="0">
+                <a:solidFill>
+                  <a:srgbClr val="000000"/>
+                </a:solidFill>
+                <a:latin typeface="+mn-lt"/>
+                <a:ea typeface="+mn-ea"/>
+                <a:cs typeface="+mn-cs"/>
+                <a:sym typeface="Source Sans Pro Light"/>
+              </a:defRPr>
+            </a:pPr>
+            <a:r>
+              <a:rPr lang="en-SG" sz="1100" dirty="0">
+                <a:latin typeface="Source Sans Pro" panose="020B0503030403020204" pitchFamily="34" charset="0"/>
+                <a:ea typeface="Source Sans Pro" panose="020B0503030403020204" pitchFamily="34" charset="0"/>
+              </a:rPr>
+              <a:t>Agilent’s Wide Table form</a:t>
+            </a:r>
+          </a:p>
+        </p:txBody>
+      </p:sp>
+      <p:sp>
+        <p:nvSpPr>
+          <p:cNvPr id="83" name="Where possible, use code that works when run.">
+            <a:extLst>
+              <a:ext uri="{FF2B5EF4-FFF2-40B4-BE49-F238E27FC236}">
+                <a16:creationId xmlns:a16="http://schemas.microsoft.com/office/drawing/2014/main" id="{08EBE30F-3865-4ED9-BA27-78324AB648F6}"/>
+              </a:ext>
+            </a:extLst>
+          </p:cNvPr>
+          <p:cNvSpPr txBox="1"/>
+          <p:nvPr/>
+        </p:nvSpPr>
+        <p:spPr>
+          <a:xfrm>
+            <a:off x="213813" y="5222152"/>
+            <a:ext cx="3231071" cy="262555"/>
+          </a:xfrm>
+          <a:prstGeom prst="rect">
+            <a:avLst/>
+          </a:prstGeom>
+          <a:ln w="12700">
+            <a:miter lim="400000"/>
+          </a:ln>
+          <a:extLst>
+            <a:ext uri="{C572A759-6A51-4108-AA02-DFA0A04FC94B}">
+              <ma14:wrappingTextBoxFlag xmlns="" xmlns:ma14="http://schemas.microsoft.com/office/mac/drawingml/2011/main" val="1"/>
+            </a:ext>
+          </a:extLst>
+        </p:spPr>
+        <p:txBody>
+          <a:bodyPr wrap="square" lIns="54570" tIns="54570" rIns="54570" bIns="54570" anchor="ctr">
+            <a:spAutoFit/>
+          </a:bodyPr>
+          <a:lstStyle/>
+          <a:p>
+            <a:pPr>
+              <a:lnSpc>
+                <a:spcPct val="90000"/>
+              </a:lnSpc>
+              <a:spcBef>
+                <a:spcPts val="300"/>
+              </a:spcBef>
+              <a:buClr>
+                <a:schemeClr val="accent4">
+                  <a:hueOff val="384618"/>
+                  <a:satOff val="3869"/>
+                  <a:lumOff val="5802"/>
+                </a:schemeClr>
+              </a:buClr>
+              <a:defRPr b="0">
+                <a:solidFill>
+                  <a:srgbClr val="000000"/>
+                </a:solidFill>
+                <a:latin typeface="+mn-lt"/>
+                <a:ea typeface="+mn-ea"/>
+                <a:cs typeface="+mn-cs"/>
+                <a:sym typeface="Source Sans Pro Light"/>
+              </a:defRPr>
+            </a:pPr>
+            <a:r>
+              <a:rPr lang="en-SG" sz="1100" dirty="0">
+                <a:latin typeface="Source Sans Pro" panose="020B0503030403020204" pitchFamily="34" charset="0"/>
+                <a:ea typeface="Source Sans Pro" panose="020B0503030403020204" pitchFamily="34" charset="0"/>
+              </a:rPr>
+              <a:t>Agilent’s Wide Table form with Qualifier</a:t>
+            </a:r>
+          </a:p>
+        </p:txBody>
+      </p:sp>
+      <p:sp>
+        <p:nvSpPr>
+          <p:cNvPr id="89" name="Where possible, use code that works when run.">
+            <a:extLst>
+              <a:ext uri="{FF2B5EF4-FFF2-40B4-BE49-F238E27FC236}">
+                <a16:creationId xmlns:a16="http://schemas.microsoft.com/office/drawing/2014/main" id="{38BC9629-0A25-4B93-B3F2-05DCF909EBF7}"/>
+              </a:ext>
+            </a:extLst>
+          </p:cNvPr>
+          <p:cNvSpPr txBox="1"/>
+          <p:nvPr/>
+        </p:nvSpPr>
+        <p:spPr>
+          <a:xfrm>
+            <a:off x="194824" y="6175063"/>
+            <a:ext cx="3231071" cy="262555"/>
+          </a:xfrm>
+          <a:prstGeom prst="rect">
+            <a:avLst/>
+          </a:prstGeom>
+          <a:ln w="12700">
+            <a:miter lim="400000"/>
+          </a:ln>
+          <a:extLst>
+            <a:ext uri="{C572A759-6A51-4108-AA02-DFA0A04FC94B}">
+              <ma14:wrappingTextBoxFlag xmlns="" xmlns:ma14="http://schemas.microsoft.com/office/mac/drawingml/2011/main" val="1"/>
+            </a:ext>
+          </a:extLst>
+        </p:spPr>
+        <p:txBody>
+          <a:bodyPr wrap="square" lIns="54570" tIns="54570" rIns="54570" bIns="54570" anchor="ctr">
+            <a:spAutoFit/>
+          </a:bodyPr>
+          <a:lstStyle/>
+          <a:p>
+            <a:pPr>
+              <a:lnSpc>
+                <a:spcPct val="90000"/>
+              </a:lnSpc>
+              <a:spcBef>
+                <a:spcPts val="300"/>
+              </a:spcBef>
+              <a:buClr>
+                <a:schemeClr val="accent4">
+                  <a:hueOff val="384618"/>
+                  <a:satOff val="3869"/>
+                  <a:lumOff val="5802"/>
+                </a:schemeClr>
+              </a:buClr>
+              <a:defRPr b="0">
+                <a:solidFill>
+                  <a:srgbClr val="000000"/>
+                </a:solidFill>
+                <a:latin typeface="+mn-lt"/>
+                <a:ea typeface="+mn-ea"/>
+                <a:cs typeface="+mn-cs"/>
+                <a:sym typeface="Source Sans Pro Light"/>
+              </a:defRPr>
+            </a:pPr>
+            <a:r>
+              <a:rPr lang="en-SG" sz="1100" dirty="0">
+                <a:latin typeface="Source Sans Pro" panose="020B0503030403020204" pitchFamily="34" charset="0"/>
+                <a:ea typeface="Source Sans Pro" panose="020B0503030403020204" pitchFamily="34" charset="0"/>
+              </a:rPr>
+              <a:t>Agilent’s Compound Table form</a:t>
+            </a:r>
+          </a:p>
+        </p:txBody>
+      </p:sp>
+      <p:sp>
+        <p:nvSpPr>
+          <p:cNvPr id="90" name="Where possible, use code that works when run.">
+            <a:extLst>
+              <a:ext uri="{FF2B5EF4-FFF2-40B4-BE49-F238E27FC236}">
+                <a16:creationId xmlns:a16="http://schemas.microsoft.com/office/drawing/2014/main" id="{14012B44-ECF0-4EAF-9D25-C8C44C354B56}"/>
+              </a:ext>
+            </a:extLst>
+          </p:cNvPr>
+          <p:cNvSpPr txBox="1"/>
+          <p:nvPr/>
+        </p:nvSpPr>
+        <p:spPr>
+          <a:xfrm>
+            <a:off x="177281" y="7079492"/>
+            <a:ext cx="3231071" cy="262555"/>
+          </a:xfrm>
+          <a:prstGeom prst="rect">
+            <a:avLst/>
+          </a:prstGeom>
+          <a:ln w="12700">
+            <a:miter lim="400000"/>
+          </a:ln>
+          <a:extLst>
+            <a:ext uri="{C572A759-6A51-4108-AA02-DFA0A04FC94B}">
+              <ma14:wrappingTextBoxFlag xmlns="" xmlns:ma14="http://schemas.microsoft.com/office/mac/drawingml/2011/main" val="1"/>
+            </a:ext>
+          </a:extLst>
+        </p:spPr>
+        <p:txBody>
+          <a:bodyPr wrap="square" lIns="54570" tIns="54570" rIns="54570" bIns="54570" anchor="ctr">
+            <a:spAutoFit/>
+          </a:bodyPr>
+          <a:lstStyle/>
+          <a:p>
+            <a:pPr>
+              <a:lnSpc>
+                <a:spcPct val="90000"/>
+              </a:lnSpc>
+              <a:spcBef>
+                <a:spcPts val="300"/>
+              </a:spcBef>
+              <a:buClr>
+                <a:schemeClr val="accent4">
+                  <a:hueOff val="384618"/>
+                  <a:satOff val="3869"/>
+                  <a:lumOff val="5802"/>
+                </a:schemeClr>
+              </a:buClr>
+              <a:defRPr b="0">
+                <a:solidFill>
+                  <a:srgbClr val="000000"/>
+                </a:solidFill>
+                <a:latin typeface="+mn-lt"/>
+                <a:ea typeface="+mn-ea"/>
+                <a:cs typeface="+mn-cs"/>
+                <a:sym typeface="Source Sans Pro Light"/>
+              </a:defRPr>
+            </a:pPr>
+            <a:r>
+              <a:rPr lang="en-SG" sz="1100" dirty="0">
+                <a:latin typeface="Source Sans Pro" panose="020B0503030403020204" pitchFamily="34" charset="0"/>
+                <a:ea typeface="Source Sans Pro" panose="020B0503030403020204" pitchFamily="34" charset="0"/>
+              </a:rPr>
+              <a:t>Agilent’s Compound Table form with Qualifier</a:t>
+            </a:r>
+          </a:p>
+        </p:txBody>
+      </p:sp>
     </p:spTree>
     <p:extLst>
       <p:ext uri="{BB962C8B-B14F-4D97-AF65-F5344CB8AC3E}">
@@ -7263,7 +7960,7 @@
           </a:ln>
           <a:extLst>
             <a:ext uri="{C572A759-6A51-4108-AA02-DFA0A04FC94B}">
-              <ma14:wrappingTextBoxFlag xmlns:ma14="http://schemas.microsoft.com/office/mac/drawingml/2011/main" xmlns="" val="1"/>
+              <ma14:wrappingTextBoxFlag xmlns="" xmlns:ma14="http://schemas.microsoft.com/office/mac/drawingml/2011/main" val="1"/>
             </a:ext>
           </a:extLst>
         </p:spPr>
@@ -7296,11 +7993,11 @@
             </a:r>
             <a:r>
               <a:rPr dirty="0"/>
-              <a:t>-0</a:t>
+              <a:t>-</a:t>
             </a:r>
             <a:r>
               <a:rPr lang="en-SG" dirty="0"/>
-              <a:t>9</a:t>
+              <a:t>10</a:t>
             </a:r>
             <a:endParaRPr dirty="0"/>
           </a:p>
@@ -7325,7 +8022,7 @@
           </a:ln>
           <a:extLst>
             <a:ext uri="{C572A759-6A51-4108-AA02-DFA0A04FC94B}">
-              <ma14:wrappingTextBoxFlag xmlns:ma14="http://schemas.microsoft.com/office/mac/drawingml/2011/main" xmlns="" val="1"/>
+              <ma14:wrappingTextBoxFlag xmlns="" xmlns:ma14="http://schemas.microsoft.com/office/mac/drawingml/2011/main" val="1"/>
             </a:ext>
           </a:extLst>
         </p:spPr>
@@ -7366,48 +8063,6 @@
       </p:sp>
       <p:sp>
         <p:nvSpPr>
-          <p:cNvPr id="296" name="Line"/>
-          <p:cNvSpPr/>
-          <p:nvPr/>
-        </p:nvSpPr>
-        <p:spPr>
-          <a:xfrm>
-            <a:off x="263649" y="1057059"/>
-            <a:ext cx="7338267" cy="23737"/>
-          </a:xfrm>
-          <a:prstGeom prst="line">
-            <a:avLst/>
-          </a:prstGeom>
-          <a:ln w="3175">
-            <a:solidFill>
-              <a:srgbClr val="767C85"/>
-            </a:solidFill>
-            <a:miter lim="400000"/>
-          </a:ln>
-        </p:spPr>
-        <p:txBody>
-          <a:bodyPr lIns="54570" tIns="54570" rIns="54570" bIns="54570" anchor="ctr"/>
-          <a:lstStyle/>
-          <a:p>
-            <a:pPr>
-              <a:lnSpc>
-                <a:spcPct val="80000"/>
-              </a:lnSpc>
-              <a:spcBef>
-                <a:spcPts val="600"/>
-              </a:spcBef>
-              <a:defRPr b="0">
-                <a:solidFill>
-                  <a:srgbClr val="000000"/>
-                </a:solidFill>
-              </a:defRPr>
-            </a:pPr>
-            <a:endParaRPr/>
-          </a:p>
-        </p:txBody>
-      </p:sp>
-      <p:sp>
-        <p:nvSpPr>
           <p:cNvPr id="298" name="CODE"/>
           <p:cNvSpPr txBox="1"/>
           <p:nvPr/>
@@ -7425,7 +8080,7 @@
           </a:ln>
           <a:extLst>
             <a:ext uri="{C572A759-6A51-4108-AA02-DFA0A04FC94B}">
-              <ma14:wrappingTextBoxFlag xmlns:ma14="http://schemas.microsoft.com/office/mac/drawingml/2011/main" xmlns="" val="1"/>
+              <ma14:wrappingTextBoxFlag xmlns="" xmlns:ma14="http://schemas.microsoft.com/office/mac/drawingml/2011/main" val="1"/>
             </a:ext>
           </a:extLst>
         </p:spPr>
@@ -7463,7 +8118,7 @@
           </a:ln>
           <a:extLst>
             <a:ext uri="{C572A759-6A51-4108-AA02-DFA0A04FC94B}">
-              <ma14:wrappingTextBoxFlag xmlns:ma14="http://schemas.microsoft.com/office/mac/drawingml/2011/main" xmlns="" val="1"/>
+              <ma14:wrappingTextBoxFlag xmlns="" xmlns:ma14="http://schemas.microsoft.com/office/mac/drawingml/2011/main" val="1"/>
             </a:ext>
           </a:extLst>
         </p:spPr>
@@ -7521,7 +8176,7 @@
           </a:ln>
           <a:extLst>
             <a:ext uri="{C572A759-6A51-4108-AA02-DFA0A04FC94B}">
-              <ma14:wrappingTextBoxFlag xmlns:ma14="http://schemas.microsoft.com/office/mac/drawingml/2011/main" xmlns="" val="1"/>
+              <ma14:wrappingTextBoxFlag xmlns="" xmlns:ma14="http://schemas.microsoft.com/office/mac/drawingml/2011/main" val="1"/>
             </a:ext>
           </a:extLst>
         </p:spPr>
@@ -7554,48 +8209,6 @@
       </p:sp>
       <p:sp>
         <p:nvSpPr>
-          <p:cNvPr id="289" name="Line"/>
-          <p:cNvSpPr/>
-          <p:nvPr/>
-        </p:nvSpPr>
-        <p:spPr>
-          <a:xfrm flipV="1">
-            <a:off x="7892715" y="1068764"/>
-            <a:ext cx="5903579" cy="1"/>
-          </a:xfrm>
-          <a:prstGeom prst="line">
-            <a:avLst/>
-          </a:prstGeom>
-          <a:ln w="3175">
-            <a:solidFill>
-              <a:srgbClr val="767C85"/>
-            </a:solidFill>
-            <a:miter lim="400000"/>
-          </a:ln>
-        </p:spPr>
-        <p:txBody>
-          <a:bodyPr lIns="54570" tIns="54570" rIns="54570" bIns="54570" anchor="ctr"/>
-          <a:lstStyle/>
-          <a:p>
-            <a:pPr>
-              <a:lnSpc>
-                <a:spcPct val="80000"/>
-              </a:lnSpc>
-              <a:spcBef>
-                <a:spcPts val="600"/>
-              </a:spcBef>
-              <a:defRPr b="0">
-                <a:solidFill>
-                  <a:srgbClr val="000000"/>
-                </a:solidFill>
-              </a:defRPr>
-            </a:pPr>
-            <a:endParaRPr/>
-          </a:p>
-        </p:txBody>
-      </p:sp>
-      <p:sp>
-        <p:nvSpPr>
           <p:cNvPr id="291" name="CODE"/>
           <p:cNvSpPr txBox="1"/>
           <p:nvPr/>
@@ -7613,7 +8226,7 @@
           </a:ln>
           <a:extLst>
             <a:ext uri="{C572A759-6A51-4108-AA02-DFA0A04FC94B}">
-              <ma14:wrappingTextBoxFlag xmlns:ma14="http://schemas.microsoft.com/office/mac/drawingml/2011/main" xmlns="" val="1"/>
+              <ma14:wrappingTextBoxFlag xmlns="" xmlns:ma14="http://schemas.microsoft.com/office/mac/drawingml/2011/main" val="1"/>
             </a:ext>
           </a:extLst>
         </p:spPr>
@@ -7657,7 +8270,7 @@
           </a:ln>
           <a:extLst>
             <a:ext uri="{C572A759-6A51-4108-AA02-DFA0A04FC94B}">
-              <ma14:wrappingTextBoxFlag xmlns:ma14="http://schemas.microsoft.com/office/mac/drawingml/2011/main" xmlns="" val="1"/>
+              <ma14:wrappingTextBoxFlag xmlns="" xmlns:ma14="http://schemas.microsoft.com/office/mac/drawingml/2011/main" val="1"/>
             </a:ext>
           </a:extLst>
         </p:spPr>
@@ -7721,7 +8334,7 @@
           </a:ln>
           <a:extLst>
             <a:ext uri="{C572A759-6A51-4108-AA02-DFA0A04FC94B}">
-              <ma14:wrappingTextBoxFlag xmlns:ma14="http://schemas.microsoft.com/office/mac/drawingml/2011/main" xmlns="" val="1"/>
+              <ma14:wrappingTextBoxFlag xmlns="" xmlns:ma14="http://schemas.microsoft.com/office/mac/drawingml/2011/main" val="1"/>
             </a:ext>
           </a:extLst>
         </p:spPr>
@@ -7836,7 +8449,7 @@
           </a:ln>
           <a:extLst>
             <a:ext uri="{C572A759-6A51-4108-AA02-DFA0A04FC94B}">
-              <ma14:wrappingTextBoxFlag xmlns:ma14="http://schemas.microsoft.com/office/mac/drawingml/2011/main" xmlns="" val="1"/>
+              <ma14:wrappingTextBoxFlag xmlns="" xmlns:ma14="http://schemas.microsoft.com/office/mac/drawingml/2011/main" val="1"/>
             </a:ext>
           </a:extLst>
         </p:spPr>
@@ -7884,7 +8497,7 @@
           </a:ln>
           <a:extLst>
             <a:ext uri="{C572A759-6A51-4108-AA02-DFA0A04FC94B}">
-              <ma14:wrappingTextBoxFlag xmlns:ma14="http://schemas.microsoft.com/office/mac/drawingml/2011/main" xmlns="" val="1"/>
+              <ma14:wrappingTextBoxFlag xmlns="" xmlns:ma14="http://schemas.microsoft.com/office/mac/drawingml/2011/main" val="1"/>
             </a:ext>
           </a:extLst>
         </p:spPr>
@@ -8000,7 +8613,7 @@
           </a:ln>
           <a:extLst>
             <a:ext uri="{C572A759-6A51-4108-AA02-DFA0A04FC94B}">
-              <ma14:wrappingTextBoxFlag xmlns:ma14="http://schemas.microsoft.com/office/mac/drawingml/2011/main" xmlns="" val="1"/>
+              <ma14:wrappingTextBoxFlag xmlns="" xmlns:ma14="http://schemas.microsoft.com/office/mac/drawingml/2011/main" val="1"/>
             </a:ext>
           </a:extLst>
         </p:spPr>
@@ -8099,7 +8712,7 @@
           </a:ln>
           <a:extLst>
             <a:ext uri="{C572A759-6A51-4108-AA02-DFA0A04FC94B}">
-              <ma14:wrappingTextBoxFlag xmlns:ma14="http://schemas.microsoft.com/office/mac/drawingml/2011/main" xmlns="" val="1"/>
+              <ma14:wrappingTextBoxFlag xmlns="" xmlns:ma14="http://schemas.microsoft.com/office/mac/drawingml/2011/main" val="1"/>
             </a:ext>
           </a:extLst>
         </p:spPr>
@@ -8295,6 +8908,54 @@
           </a:prstGeom>
         </p:spPr>
       </p:pic>
+      <p:sp>
+        <p:nvSpPr>
+          <p:cNvPr id="24" name="Line">
+            <a:extLst>
+              <a:ext uri="{FF2B5EF4-FFF2-40B4-BE49-F238E27FC236}">
+                <a16:creationId xmlns:a16="http://schemas.microsoft.com/office/drawing/2014/main" id="{FFC3C9A8-CD88-49B3-9CB8-F069967CF200}"/>
+              </a:ext>
+            </a:extLst>
+          </p:cNvPr>
+          <p:cNvSpPr/>
+          <p:nvPr/>
+        </p:nvSpPr>
+        <p:spPr>
+          <a:xfrm flipV="1">
+            <a:off x="0" y="1016734"/>
+            <a:ext cx="13963719" cy="48592"/>
+          </a:xfrm>
+          <a:prstGeom prst="line">
+            <a:avLst/>
+          </a:prstGeom>
+          <a:ln w="3175">
+            <a:solidFill>
+              <a:srgbClr val="767C85"/>
+            </a:solidFill>
+            <a:miter lim="400000"/>
+          </a:ln>
+        </p:spPr>
+        <p:txBody>
+          <a:bodyPr lIns="54570" tIns="54570" rIns="54570" bIns="54570" anchor="ctr"/>
+          <a:lstStyle/>
+          <a:p>
+            <a:pPr>
+              <a:lnSpc>
+                <a:spcPct val="80000"/>
+              </a:lnSpc>
+              <a:spcBef>
+                <a:spcPts val="600"/>
+              </a:spcBef>
+              <a:defRPr b="0">
+                <a:solidFill>
+                  <a:srgbClr val="000000"/>
+                </a:solidFill>
+              </a:defRPr>
+            </a:pPr>
+            <a:endParaRPr/>
+          </a:p>
+        </p:txBody>
+      </p:sp>
     </p:spTree>
     <p:extLst>
       <p:ext uri="{BB962C8B-B14F-4D97-AF65-F5344CB8AC3E}">

</xml_diff>